<commit_message>
am243x: hdsl: Update release notes and module documentation
- Add new features list
- Update bug list and compatibility section in release note
- Add details on SYNC mode with different ES values
- Add details on dynamic firmware loading for TX-PRU

Fixes: PINDSW-7051, PINDSW-6268

Signed-off-by: Dhaval Khandla <dhavaljk@ti.com>
</commit_message>
<xml_diff>
--- a/docs_src/docs/api_guide/images/images.pptx
+++ b/docs_src/docs/api_guide/images/images.pptx
@@ -8,6 +8,7 @@
     <p:sldId id="284" r:id="rId2"/>
     <p:sldId id="287" r:id="rId3"/>
     <p:sldId id="288" r:id="rId4"/>
+    <p:sldId id="289" r:id="rId5"/>
   </p:sldIdLst>
   <p:sldSz cx="14630400" cy="8229600"/>
   <p:notesSz cx="7559675" cy="10691813"/>
@@ -14400,6 +14401,2130 @@
 </p:sld>
 </file>
 
+<file path=ppt/slides/slide4.xml><?xml version="1.0" encoding="utf-8"?>
+<p:sld xmlns:a="http://schemas.openxmlformats.org/drawingml/2006/main" xmlns:r="http://schemas.openxmlformats.org/officeDocument/2006/relationships" xmlns:p="http://schemas.openxmlformats.org/presentationml/2006/main">
+  <p:cSld>
+    <p:spTree>
+      <p:nvGrpSpPr>
+        <p:cNvPr id="1" name=""/>
+        <p:cNvGrpSpPr/>
+        <p:nvPr/>
+      </p:nvGrpSpPr>
+      <p:grpSpPr>
+        <a:xfrm>
+          <a:off x="0" y="0"/>
+          <a:ext cx="0" cy="0"/>
+          <a:chOff x="0" y="0"/>
+          <a:chExt cx="0" cy="0"/>
+        </a:xfrm>
+      </p:grpSpPr>
+      <p:grpSp>
+        <p:nvGrpSpPr>
+          <p:cNvPr id="34" name="Group 33">
+            <a:extLst>
+              <a:ext uri="{FF2B5EF4-FFF2-40B4-BE49-F238E27FC236}">
+                <a16:creationId xmlns:a16="http://schemas.microsoft.com/office/drawing/2014/main" id="{33A0F9E4-27E3-4635-AA9C-771DC0339932}"/>
+              </a:ext>
+            </a:extLst>
+          </p:cNvPr>
+          <p:cNvGrpSpPr/>
+          <p:nvPr/>
+        </p:nvGrpSpPr>
+        <p:grpSpPr>
+          <a:xfrm>
+            <a:off x="677407" y="4492889"/>
+            <a:ext cx="10815034" cy="830997"/>
+            <a:chOff x="1275321" y="3007586"/>
+            <a:chExt cx="10815034" cy="830997"/>
+          </a:xfrm>
+        </p:grpSpPr>
+        <p:sp>
+          <p:nvSpPr>
+            <p:cNvPr id="17" name="TextBox 16">
+              <a:extLst>
+                <a:ext uri="{FF2B5EF4-FFF2-40B4-BE49-F238E27FC236}">
+                  <a16:creationId xmlns:a16="http://schemas.microsoft.com/office/drawing/2014/main" id="{AE1EE412-EA5D-44E4-A4DB-35EEA3DCCF0F}"/>
+                </a:ext>
+              </a:extLst>
+            </p:cNvPr>
+            <p:cNvSpPr txBox="1"/>
+            <p:nvPr/>
+          </p:nvSpPr>
+          <p:spPr>
+            <a:xfrm>
+              <a:off x="1275321" y="3007586"/>
+              <a:ext cx="1499093" cy="830997"/>
+            </a:xfrm>
+            <a:prstGeom prst="rect">
+              <a:avLst/>
+            </a:prstGeom>
+            <a:noFill/>
+          </p:spPr>
+          <p:txBody>
+            <a:bodyPr wrap="square" rtlCol="0">
+              <a:spAutoFit/>
+            </a:bodyPr>
+            <a:lstStyle/>
+            <a:p>
+              <a:pPr algn="ctr"/>
+              <a:r>
+                <a:rPr lang="en-US" sz="1600" u="sng" dirty="0"/>
+                <a:t>Symbol in </a:t>
+              </a:r>
+            </a:p>
+            <a:p>
+              <a:pPr algn="ctr"/>
+              <a:r>
+                <a:rPr lang="en-US" sz="1600" u="sng" dirty="0"/>
+                <a:t>Parameter Channel</a:t>
+              </a:r>
+            </a:p>
+          </p:txBody>
+        </p:sp>
+        <p:sp>
+          <p:nvSpPr>
+            <p:cNvPr id="30" name="TextBox 29">
+              <a:extLst>
+                <a:ext uri="{FF2B5EF4-FFF2-40B4-BE49-F238E27FC236}">
+                  <a16:creationId xmlns:a16="http://schemas.microsoft.com/office/drawing/2014/main" id="{CB2BD7B3-BC9F-44EF-9E85-400FA10D1575}"/>
+                </a:ext>
+              </a:extLst>
+            </p:cNvPr>
+            <p:cNvSpPr txBox="1"/>
+            <p:nvPr/>
+          </p:nvSpPr>
+          <p:spPr>
+            <a:xfrm>
+              <a:off x="2579506" y="3269214"/>
+              <a:ext cx="1237839" cy="307777"/>
+            </a:xfrm>
+            <a:prstGeom prst="rect">
+              <a:avLst/>
+            </a:prstGeom>
+            <a:noFill/>
+          </p:spPr>
+          <p:txBody>
+            <a:bodyPr wrap="none" rtlCol="0">
+              <a:spAutoFit/>
+            </a:bodyPr>
+            <a:lstStyle/>
+            <a:p>
+              <a:r>
+                <a:rPr lang="en-US" sz="1400" dirty="0"/>
+                <a:t>m_par_reset </a:t>
+              </a:r>
+            </a:p>
+          </p:txBody>
+        </p:sp>
+        <p:sp>
+          <p:nvSpPr>
+            <p:cNvPr id="39" name="TextBox 38">
+              <a:extLst>
+                <a:ext uri="{FF2B5EF4-FFF2-40B4-BE49-F238E27FC236}">
+                  <a16:creationId xmlns:a16="http://schemas.microsoft.com/office/drawing/2014/main" id="{CFC42128-0E83-4C51-9F9B-2F3ACE595749}"/>
+                </a:ext>
+              </a:extLst>
+            </p:cNvPr>
+            <p:cNvSpPr txBox="1"/>
+            <p:nvPr/>
+          </p:nvSpPr>
+          <p:spPr>
+            <a:xfrm>
+              <a:off x="3682906" y="3269204"/>
+              <a:ext cx="1208985" cy="307777"/>
+            </a:xfrm>
+            <a:prstGeom prst="rect">
+              <a:avLst/>
+            </a:prstGeom>
+            <a:noFill/>
+          </p:spPr>
+          <p:txBody>
+            <a:bodyPr wrap="none" rtlCol="0">
+              <a:spAutoFit/>
+            </a:bodyPr>
+            <a:lstStyle/>
+            <a:p>
+              <a:r>
+                <a:rPr lang="en-US" sz="1400" dirty="0"/>
+                <a:t>m_par_sync </a:t>
+              </a:r>
+            </a:p>
+          </p:txBody>
+        </p:sp>
+        <p:sp>
+          <p:nvSpPr>
+            <p:cNvPr id="40" name="TextBox 39">
+              <a:extLst>
+                <a:ext uri="{FF2B5EF4-FFF2-40B4-BE49-F238E27FC236}">
+                  <a16:creationId xmlns:a16="http://schemas.microsoft.com/office/drawing/2014/main" id="{D94CC912-E49B-4A6E-9064-840A8A09749D}"/>
+                </a:ext>
+              </a:extLst>
+            </p:cNvPr>
+            <p:cNvSpPr txBox="1"/>
+            <p:nvPr/>
+          </p:nvSpPr>
+          <p:spPr>
+            <a:xfrm>
+              <a:off x="4696182" y="3161482"/>
+              <a:ext cx="1237839" cy="523220"/>
+            </a:xfrm>
+            <a:prstGeom prst="rect">
+              <a:avLst/>
+            </a:prstGeom>
+            <a:noFill/>
+          </p:spPr>
+          <p:txBody>
+            <a:bodyPr wrap="none" rtlCol="0">
+              <a:spAutoFit/>
+            </a:bodyPr>
+            <a:lstStyle/>
+            <a:p>
+              <a:r>
+                <a:rPr lang="en-US" sz="1400" dirty="0"/>
+                <a:t>m_par_start/</a:t>
+              </a:r>
+            </a:p>
+            <a:p>
+              <a:r>
+                <a:rPr lang="en-US" sz="1400" dirty="0"/>
+                <a:t>m_par_learn </a:t>
+              </a:r>
+            </a:p>
+          </p:txBody>
+        </p:sp>
+        <p:sp>
+          <p:nvSpPr>
+            <p:cNvPr id="42" name="TextBox 41">
+              <a:extLst>
+                <a:ext uri="{FF2B5EF4-FFF2-40B4-BE49-F238E27FC236}">
+                  <a16:creationId xmlns:a16="http://schemas.microsoft.com/office/drawing/2014/main" id="{F9D9EBEE-936F-42EA-98AF-C31863A7FA8D}"/>
+                </a:ext>
+              </a:extLst>
+            </p:cNvPr>
+            <p:cNvSpPr txBox="1"/>
+            <p:nvPr/>
+          </p:nvSpPr>
+          <p:spPr>
+            <a:xfrm>
+              <a:off x="5800382" y="3269203"/>
+              <a:ext cx="1308371" cy="307777"/>
+            </a:xfrm>
+            <a:prstGeom prst="rect">
+              <a:avLst/>
+            </a:prstGeom>
+            <a:noFill/>
+          </p:spPr>
+          <p:txBody>
+            <a:bodyPr wrap="none" rtlCol="0">
+              <a:spAutoFit/>
+            </a:bodyPr>
+            <a:lstStyle/>
+            <a:p>
+              <a:r>
+                <a:rPr lang="en-US" sz="1400" dirty="0"/>
+                <a:t>m_par_check </a:t>
+              </a:r>
+            </a:p>
+          </p:txBody>
+        </p:sp>
+        <p:sp>
+          <p:nvSpPr>
+            <p:cNvPr id="44" name="TextBox 43">
+              <a:extLst>
+                <a:ext uri="{FF2B5EF4-FFF2-40B4-BE49-F238E27FC236}">
+                  <a16:creationId xmlns:a16="http://schemas.microsoft.com/office/drawing/2014/main" id="{61AFDEDD-2BE2-4FA7-9ECC-D8D7E3F3E4BA}"/>
+                </a:ext>
+              </a:extLst>
+            </p:cNvPr>
+            <p:cNvSpPr txBox="1"/>
+            <p:nvPr/>
+          </p:nvSpPr>
+          <p:spPr>
+            <a:xfrm>
+              <a:off x="6946138" y="3269198"/>
+              <a:ext cx="1237839" cy="307777"/>
+            </a:xfrm>
+            <a:prstGeom prst="rect">
+              <a:avLst/>
+            </a:prstGeom>
+            <a:noFill/>
+          </p:spPr>
+          <p:txBody>
+            <a:bodyPr wrap="none" rtlCol="0">
+              <a:spAutoFit/>
+            </a:bodyPr>
+            <a:lstStyle/>
+            <a:p>
+              <a:r>
+                <a:rPr lang="en-US" sz="1400" dirty="0"/>
+                <a:t>m_par_idreq </a:t>
+              </a:r>
+            </a:p>
+          </p:txBody>
+        </p:sp>
+        <p:sp>
+          <p:nvSpPr>
+            <p:cNvPr id="46" name="TextBox 45">
+              <a:extLst>
+                <a:ext uri="{FF2B5EF4-FFF2-40B4-BE49-F238E27FC236}">
+                  <a16:creationId xmlns:a16="http://schemas.microsoft.com/office/drawing/2014/main" id="{286B4ECD-7886-4851-B61C-478471DF8B68}"/>
+                </a:ext>
+              </a:extLst>
+            </p:cNvPr>
+            <p:cNvSpPr txBox="1"/>
+            <p:nvPr/>
+          </p:nvSpPr>
+          <p:spPr>
+            <a:xfrm>
+              <a:off x="11020831" y="3269197"/>
+              <a:ext cx="1069524" cy="307777"/>
+            </a:xfrm>
+            <a:prstGeom prst="rect">
+              <a:avLst/>
+            </a:prstGeom>
+            <a:noFill/>
+          </p:spPr>
+          <p:txBody>
+            <a:bodyPr wrap="none" rtlCol="0">
+              <a:spAutoFit/>
+            </a:bodyPr>
+            <a:lstStyle/>
+            <a:p>
+              <a:r>
+                <a:rPr lang="en-US" sz="1400" dirty="0"/>
+                <a:t>m_par_init </a:t>
+              </a:r>
+            </a:p>
+          </p:txBody>
+        </p:sp>
+      </p:grpSp>
+      <p:grpSp>
+        <p:nvGrpSpPr>
+          <p:cNvPr id="33" name="Group 32">
+            <a:extLst>
+              <a:ext uri="{FF2B5EF4-FFF2-40B4-BE49-F238E27FC236}">
+                <a16:creationId xmlns:a16="http://schemas.microsoft.com/office/drawing/2014/main" id="{FFD961F2-DB9E-4A69-81BC-22C1AA665118}"/>
+              </a:ext>
+            </a:extLst>
+          </p:cNvPr>
+          <p:cNvGrpSpPr/>
+          <p:nvPr/>
+        </p:nvGrpSpPr>
+        <p:grpSpPr>
+          <a:xfrm>
+            <a:off x="1022776" y="2367086"/>
+            <a:ext cx="12946611" cy="2173289"/>
+            <a:chOff x="1595653" y="670489"/>
+            <a:chExt cx="12946611" cy="2173289"/>
+          </a:xfrm>
+        </p:grpSpPr>
+        <p:grpSp>
+          <p:nvGrpSpPr>
+            <p:cNvPr id="3" name="Group 2">
+              <a:extLst>
+                <a:ext uri="{FF2B5EF4-FFF2-40B4-BE49-F238E27FC236}">
+                  <a16:creationId xmlns:a16="http://schemas.microsoft.com/office/drawing/2014/main" id="{090879E4-7BAD-4097-BD75-952D0D1FA397}"/>
+                </a:ext>
+              </a:extLst>
+            </p:cNvPr>
+            <p:cNvGrpSpPr/>
+            <p:nvPr/>
+          </p:nvGrpSpPr>
+          <p:grpSpPr>
+            <a:xfrm>
+              <a:off x="1731483" y="670489"/>
+              <a:ext cx="12810781" cy="2173289"/>
+              <a:chOff x="89970" y="703539"/>
+              <a:chExt cx="12810781" cy="2173289"/>
+            </a:xfrm>
+          </p:grpSpPr>
+          <p:sp>
+            <p:nvSpPr>
+              <p:cNvPr id="5" name="Oval 4">
+                <a:extLst>
+                  <a:ext uri="{FF2B5EF4-FFF2-40B4-BE49-F238E27FC236}">
+                    <a16:creationId xmlns:a16="http://schemas.microsoft.com/office/drawing/2014/main" id="{693E4C6B-273B-4B7E-B3B4-A82385ECEEDF}"/>
+                  </a:ext>
+                </a:extLst>
+              </p:cNvPr>
+              <p:cNvSpPr/>
+              <p:nvPr/>
+            </p:nvSpPr>
+            <p:spPr>
+              <a:xfrm>
+                <a:off x="89970" y="1439538"/>
+                <a:ext cx="837282" cy="859315"/>
+              </a:xfrm>
+              <a:prstGeom prst="ellipse">
+                <a:avLst/>
+              </a:prstGeom>
+            </p:spPr>
+            <p:style>
+              <a:lnRef idx="2">
+                <a:schemeClr val="accent2">
+                  <a:shade val="50000"/>
+                </a:schemeClr>
+              </a:lnRef>
+              <a:fillRef idx="1">
+                <a:schemeClr val="accent2"/>
+              </a:fillRef>
+              <a:effectRef idx="0">
+                <a:schemeClr val="accent2"/>
+              </a:effectRef>
+              <a:fontRef idx="minor">
+                <a:schemeClr val="lt1"/>
+              </a:fontRef>
+            </p:style>
+            <p:txBody>
+              <a:bodyPr wrap="none" rtlCol="0" anchor="ctr">
+                <a:noAutofit/>
+              </a:bodyPr>
+              <a:lstStyle/>
+              <a:p>
+                <a:pPr algn="ctr"/>
+                <a:r>
+                  <a:rPr lang="en-US" sz="1400" b="1" dirty="0"/>
+                  <a:t>LOAD</a:t>
+                </a:r>
+              </a:p>
+              <a:p>
+                <a:pPr algn="ctr"/>
+                <a:r>
+                  <a:rPr lang="en-US" sz="1400" b="1" dirty="0"/>
+                  <a:t>FW1</a:t>
+                </a:r>
+              </a:p>
+            </p:txBody>
+          </p:sp>
+          <p:sp>
+            <p:nvSpPr>
+              <p:cNvPr id="6" name="Oval 5">
+                <a:extLst>
+                  <a:ext uri="{FF2B5EF4-FFF2-40B4-BE49-F238E27FC236}">
+                    <a16:creationId xmlns:a16="http://schemas.microsoft.com/office/drawing/2014/main" id="{D261FCBA-BF90-4821-BEE0-C18D8B536D2D}"/>
+                  </a:ext>
+                </a:extLst>
+              </p:cNvPr>
+              <p:cNvSpPr/>
+              <p:nvPr/>
+            </p:nvSpPr>
+            <p:spPr>
+              <a:xfrm>
+                <a:off x="2175832" y="1439537"/>
+                <a:ext cx="837282" cy="859315"/>
+              </a:xfrm>
+              <a:prstGeom prst="ellipse">
+                <a:avLst/>
+              </a:prstGeom>
+            </p:spPr>
+            <p:style>
+              <a:lnRef idx="2">
+                <a:schemeClr val="accent2">
+                  <a:shade val="50000"/>
+                </a:schemeClr>
+              </a:lnRef>
+              <a:fillRef idx="1">
+                <a:schemeClr val="accent2"/>
+              </a:fillRef>
+              <a:effectRef idx="0">
+                <a:schemeClr val="accent2"/>
+              </a:effectRef>
+              <a:fontRef idx="minor">
+                <a:schemeClr val="lt1"/>
+              </a:fontRef>
+            </p:style>
+            <p:txBody>
+              <a:bodyPr wrap="none" rtlCol="0" anchor="ctr">
+                <a:noAutofit/>
+              </a:bodyPr>
+              <a:lstStyle/>
+              <a:p>
+                <a:pPr algn="ctr"/>
+                <a:r>
+                  <a:rPr lang="en-US" sz="1400" b="1" dirty="0"/>
+                  <a:t>SYNC</a:t>
+                </a:r>
+              </a:p>
+            </p:txBody>
+          </p:sp>
+          <p:sp>
+            <p:nvSpPr>
+              <p:cNvPr id="7" name="Oval 6">
+                <a:extLst>
+                  <a:ext uri="{FF2B5EF4-FFF2-40B4-BE49-F238E27FC236}">
+                    <a16:creationId xmlns:a16="http://schemas.microsoft.com/office/drawing/2014/main" id="{6F129CE7-45CA-40A9-9E09-51A51F0ED3F8}"/>
+                  </a:ext>
+                </a:extLst>
+              </p:cNvPr>
+              <p:cNvSpPr/>
+              <p:nvPr/>
+            </p:nvSpPr>
+            <p:spPr>
+              <a:xfrm>
+                <a:off x="3218763" y="1439537"/>
+                <a:ext cx="837282" cy="859315"/>
+              </a:xfrm>
+              <a:prstGeom prst="ellipse">
+                <a:avLst/>
+              </a:prstGeom>
+            </p:spPr>
+            <p:style>
+              <a:lnRef idx="2">
+                <a:schemeClr val="accent2">
+                  <a:shade val="50000"/>
+                </a:schemeClr>
+              </a:lnRef>
+              <a:fillRef idx="1">
+                <a:schemeClr val="accent2"/>
+              </a:fillRef>
+              <a:effectRef idx="0">
+                <a:schemeClr val="accent2"/>
+              </a:effectRef>
+              <a:fontRef idx="minor">
+                <a:schemeClr val="lt1"/>
+              </a:fontRef>
+            </p:style>
+            <p:txBody>
+              <a:bodyPr wrap="none" rtlCol="0" anchor="ctr">
+                <a:noAutofit/>
+              </a:bodyPr>
+              <a:lstStyle/>
+              <a:p>
+                <a:pPr algn="ctr"/>
+                <a:r>
+                  <a:rPr lang="en-US" sz="1400" b="1" dirty="0"/>
+                  <a:t>LEARN</a:t>
+                </a:r>
+              </a:p>
+            </p:txBody>
+          </p:sp>
+          <p:sp>
+            <p:nvSpPr>
+              <p:cNvPr id="8" name="Oval 7">
+                <a:extLst>
+                  <a:ext uri="{FF2B5EF4-FFF2-40B4-BE49-F238E27FC236}">
+                    <a16:creationId xmlns:a16="http://schemas.microsoft.com/office/drawing/2014/main" id="{CAA6029E-859D-4440-A726-74EBF17748CF}"/>
+                  </a:ext>
+                </a:extLst>
+              </p:cNvPr>
+              <p:cNvSpPr/>
+              <p:nvPr/>
+            </p:nvSpPr>
+            <p:spPr>
+              <a:xfrm>
+                <a:off x="4261694" y="1439536"/>
+                <a:ext cx="837282" cy="859315"/>
+              </a:xfrm>
+              <a:prstGeom prst="ellipse">
+                <a:avLst/>
+              </a:prstGeom>
+            </p:spPr>
+            <p:style>
+              <a:lnRef idx="2">
+                <a:schemeClr val="accent2">
+                  <a:shade val="50000"/>
+                </a:schemeClr>
+              </a:lnRef>
+              <a:fillRef idx="1">
+                <a:schemeClr val="accent2"/>
+              </a:fillRef>
+              <a:effectRef idx="0">
+                <a:schemeClr val="accent2"/>
+              </a:effectRef>
+              <a:fontRef idx="minor">
+                <a:schemeClr val="lt1"/>
+              </a:fontRef>
+            </p:style>
+            <p:txBody>
+              <a:bodyPr wrap="none" rtlCol="0" anchor="ctr">
+                <a:noAutofit/>
+              </a:bodyPr>
+              <a:lstStyle/>
+              <a:p>
+                <a:pPr algn="ctr"/>
+                <a:r>
+                  <a:rPr lang="en-US" sz="1400" b="1" dirty="0"/>
+                  <a:t>LINE</a:t>
+                </a:r>
+              </a:p>
+              <a:p>
+                <a:pPr algn="ctr"/>
+                <a:r>
+                  <a:rPr lang="en-US" sz="1400" b="1" dirty="0"/>
+                  <a:t>CHECK</a:t>
+                </a:r>
+              </a:p>
+            </p:txBody>
+          </p:sp>
+          <p:sp>
+            <p:nvSpPr>
+              <p:cNvPr id="9" name="Oval 8">
+                <a:extLst>
+                  <a:ext uri="{FF2B5EF4-FFF2-40B4-BE49-F238E27FC236}">
+                    <a16:creationId xmlns:a16="http://schemas.microsoft.com/office/drawing/2014/main" id="{601322BA-6C7C-485D-A7A6-2545417D68DA}"/>
+                  </a:ext>
+                </a:extLst>
+              </p:cNvPr>
+              <p:cNvSpPr/>
+              <p:nvPr/>
+            </p:nvSpPr>
+            <p:spPr>
+              <a:xfrm>
+                <a:off x="5304625" y="1439536"/>
+                <a:ext cx="837282" cy="859315"/>
+              </a:xfrm>
+              <a:prstGeom prst="ellipse">
+                <a:avLst/>
+              </a:prstGeom>
+            </p:spPr>
+            <p:style>
+              <a:lnRef idx="2">
+                <a:schemeClr val="accent2">
+                  <a:shade val="50000"/>
+                </a:schemeClr>
+              </a:lnRef>
+              <a:fillRef idx="1">
+                <a:schemeClr val="accent2"/>
+              </a:fillRef>
+              <a:effectRef idx="0">
+                <a:schemeClr val="accent2"/>
+              </a:effectRef>
+              <a:fontRef idx="minor">
+                <a:schemeClr val="lt1"/>
+              </a:fontRef>
+            </p:style>
+            <p:txBody>
+              <a:bodyPr wrap="none" rtlCol="0" anchor="ctr">
+                <a:noAutofit/>
+              </a:bodyPr>
+              <a:lstStyle/>
+              <a:p>
+                <a:pPr algn="ctr"/>
+                <a:r>
+                  <a:rPr lang="en-US" sz="1400" b="1" dirty="0"/>
+                  <a:t>ID REQ</a:t>
+                </a:r>
+              </a:p>
+            </p:txBody>
+          </p:sp>
+          <p:sp>
+            <p:nvSpPr>
+              <p:cNvPr id="10" name="Oval 9">
+                <a:extLst>
+                  <a:ext uri="{FF2B5EF4-FFF2-40B4-BE49-F238E27FC236}">
+                    <a16:creationId xmlns:a16="http://schemas.microsoft.com/office/drawing/2014/main" id="{550786EA-161D-439A-923D-01752AFFB35A}"/>
+                  </a:ext>
+                </a:extLst>
+              </p:cNvPr>
+              <p:cNvSpPr/>
+              <p:nvPr/>
+            </p:nvSpPr>
+            <p:spPr>
+              <a:xfrm>
+                <a:off x="6347556" y="1439536"/>
+                <a:ext cx="837282" cy="859315"/>
+              </a:xfrm>
+              <a:prstGeom prst="ellipse">
+                <a:avLst/>
+              </a:prstGeom>
+            </p:spPr>
+            <p:style>
+              <a:lnRef idx="2">
+                <a:schemeClr val="accent2">
+                  <a:shade val="50000"/>
+                </a:schemeClr>
+              </a:lnRef>
+              <a:fillRef idx="1">
+                <a:schemeClr val="accent2"/>
+              </a:fillRef>
+              <a:effectRef idx="0">
+                <a:schemeClr val="accent2"/>
+              </a:effectRef>
+              <a:fontRef idx="minor">
+                <a:schemeClr val="lt1"/>
+              </a:fontRef>
+            </p:style>
+            <p:txBody>
+              <a:bodyPr wrap="none" rtlCol="0" anchor="ctr">
+                <a:noAutofit/>
+              </a:bodyPr>
+              <a:lstStyle/>
+              <a:p>
+                <a:pPr algn="ctr"/>
+                <a:r>
+                  <a:rPr lang="en-US" sz="1400" b="1" dirty="0"/>
+                  <a:t>ID </a:t>
+                </a:r>
+              </a:p>
+              <a:p>
+                <a:pPr algn="ctr"/>
+                <a:r>
+                  <a:rPr lang="en-US" sz="1400" b="1" dirty="0"/>
+                  <a:t>STORE</a:t>
+                </a:r>
+              </a:p>
+            </p:txBody>
+          </p:sp>
+          <p:sp>
+            <p:nvSpPr>
+              <p:cNvPr id="11" name="Oval 10">
+                <a:extLst>
+                  <a:ext uri="{FF2B5EF4-FFF2-40B4-BE49-F238E27FC236}">
+                    <a16:creationId xmlns:a16="http://schemas.microsoft.com/office/drawing/2014/main" id="{F60D0AF8-BDB9-4160-B36F-F47545FDE958}"/>
+                  </a:ext>
+                </a:extLst>
+              </p:cNvPr>
+              <p:cNvSpPr/>
+              <p:nvPr/>
+            </p:nvSpPr>
+            <p:spPr>
+              <a:xfrm>
+                <a:off x="1132901" y="1439539"/>
+                <a:ext cx="837282" cy="859315"/>
+              </a:xfrm>
+              <a:prstGeom prst="ellipse">
+                <a:avLst/>
+              </a:prstGeom>
+            </p:spPr>
+            <p:style>
+              <a:lnRef idx="2">
+                <a:schemeClr val="accent2">
+                  <a:shade val="50000"/>
+                </a:schemeClr>
+              </a:lnRef>
+              <a:fillRef idx="1">
+                <a:schemeClr val="accent2"/>
+              </a:fillRef>
+              <a:effectRef idx="0">
+                <a:schemeClr val="accent2"/>
+              </a:effectRef>
+              <a:fontRef idx="minor">
+                <a:schemeClr val="lt1"/>
+              </a:fontRef>
+            </p:style>
+            <p:txBody>
+              <a:bodyPr wrap="none" rtlCol="0" anchor="ctr">
+                <a:noAutofit/>
+              </a:bodyPr>
+              <a:lstStyle/>
+              <a:p>
+                <a:pPr algn="ctr"/>
+                <a:r>
+                  <a:rPr lang="en-US" sz="1400" b="1" dirty="0"/>
+                  <a:t>RESET</a:t>
+                </a:r>
+              </a:p>
+            </p:txBody>
+          </p:sp>
+          <p:sp>
+            <p:nvSpPr>
+              <p:cNvPr id="12" name="Oval 11">
+                <a:extLst>
+                  <a:ext uri="{FF2B5EF4-FFF2-40B4-BE49-F238E27FC236}">
+                    <a16:creationId xmlns:a16="http://schemas.microsoft.com/office/drawing/2014/main" id="{A83F363F-8BBB-436C-A11F-35FEE348B391}"/>
+                  </a:ext>
+                </a:extLst>
+              </p:cNvPr>
+              <p:cNvSpPr/>
+              <p:nvPr/>
+            </p:nvSpPr>
+            <p:spPr>
+              <a:xfrm>
+                <a:off x="7390487" y="1439536"/>
+                <a:ext cx="837282" cy="859315"/>
+              </a:xfrm>
+              <a:prstGeom prst="ellipse">
+                <a:avLst/>
+              </a:prstGeom>
+            </p:spPr>
+            <p:style>
+              <a:lnRef idx="2">
+                <a:schemeClr val="accent2">
+                  <a:shade val="50000"/>
+                </a:schemeClr>
+              </a:lnRef>
+              <a:fillRef idx="1">
+                <a:schemeClr val="accent2"/>
+              </a:fillRef>
+              <a:effectRef idx="0">
+                <a:schemeClr val="accent2"/>
+              </a:effectRef>
+              <a:fontRef idx="minor">
+                <a:schemeClr val="lt1"/>
+              </a:fontRef>
+            </p:style>
+            <p:txBody>
+              <a:bodyPr wrap="none" rtlCol="0" anchor="ctr">
+                <a:noAutofit/>
+              </a:bodyPr>
+              <a:lstStyle/>
+              <a:p>
+                <a:pPr algn="ctr"/>
+                <a:r>
+                  <a:rPr lang="en-US" sz="1400" b="1" dirty="0"/>
+                  <a:t>ID </a:t>
+                </a:r>
+              </a:p>
+              <a:p>
+                <a:pPr algn="ctr"/>
+                <a:r>
+                  <a:rPr lang="en-US" sz="1400" b="1" dirty="0"/>
+                  <a:t>COMP</a:t>
+                </a:r>
+              </a:p>
+            </p:txBody>
+          </p:sp>
+          <p:sp>
+            <p:nvSpPr>
+              <p:cNvPr id="13" name="Oval 12">
+                <a:extLst>
+                  <a:ext uri="{FF2B5EF4-FFF2-40B4-BE49-F238E27FC236}">
+                    <a16:creationId xmlns:a16="http://schemas.microsoft.com/office/drawing/2014/main" id="{5F7CB5AE-0B76-474E-9E26-0484B942AE2B}"/>
+                  </a:ext>
+                </a:extLst>
+              </p:cNvPr>
+              <p:cNvSpPr/>
+              <p:nvPr/>
+            </p:nvSpPr>
+            <p:spPr>
+              <a:xfrm>
+                <a:off x="8433418" y="1439536"/>
+                <a:ext cx="837282" cy="859315"/>
+              </a:xfrm>
+              <a:prstGeom prst="ellipse">
+                <a:avLst/>
+              </a:prstGeom>
+            </p:spPr>
+            <p:style>
+              <a:lnRef idx="2">
+                <a:schemeClr val="accent2">
+                  <a:shade val="50000"/>
+                </a:schemeClr>
+              </a:lnRef>
+              <a:fillRef idx="1">
+                <a:schemeClr val="accent2"/>
+              </a:fillRef>
+              <a:effectRef idx="0">
+                <a:schemeClr val="accent2"/>
+              </a:effectRef>
+              <a:fontRef idx="minor">
+                <a:schemeClr val="lt1"/>
+              </a:fontRef>
+            </p:style>
+            <p:txBody>
+              <a:bodyPr wrap="none" rtlCol="0" anchor="ctr">
+                <a:noAutofit/>
+              </a:bodyPr>
+              <a:lstStyle/>
+              <a:p>
+                <a:pPr algn="ctr"/>
+                <a:r>
+                  <a:rPr lang="en-US" sz="1400" b="1" dirty="0"/>
+                  <a:t>LOAD </a:t>
+                </a:r>
+              </a:p>
+              <a:p>
+                <a:pPr algn="ctr"/>
+                <a:r>
+                  <a:rPr lang="en-US" sz="1400" b="1" dirty="0"/>
+                  <a:t>FW2</a:t>
+                </a:r>
+              </a:p>
+            </p:txBody>
+          </p:sp>
+          <p:sp>
+            <p:nvSpPr>
+              <p:cNvPr id="14" name="Oval 13">
+                <a:extLst>
+                  <a:ext uri="{FF2B5EF4-FFF2-40B4-BE49-F238E27FC236}">
+                    <a16:creationId xmlns:a16="http://schemas.microsoft.com/office/drawing/2014/main" id="{F5DAA941-7F7D-46E5-AF91-8FE745B607D5}"/>
+                  </a:ext>
+                </a:extLst>
+              </p:cNvPr>
+              <p:cNvSpPr/>
+              <p:nvPr/>
+            </p:nvSpPr>
+            <p:spPr>
+              <a:xfrm>
+                <a:off x="9476349" y="1439535"/>
+                <a:ext cx="837282" cy="859315"/>
+              </a:xfrm>
+              <a:prstGeom prst="ellipse">
+                <a:avLst/>
+              </a:prstGeom>
+            </p:spPr>
+            <p:style>
+              <a:lnRef idx="2">
+                <a:schemeClr val="accent2">
+                  <a:shade val="50000"/>
+                </a:schemeClr>
+              </a:lnRef>
+              <a:fillRef idx="1">
+                <a:schemeClr val="accent2"/>
+              </a:fillRef>
+              <a:effectRef idx="0">
+                <a:schemeClr val="accent2"/>
+              </a:effectRef>
+              <a:fontRef idx="minor">
+                <a:schemeClr val="lt1"/>
+              </a:fontRef>
+            </p:style>
+            <p:txBody>
+              <a:bodyPr wrap="none" rtlCol="0" anchor="ctr">
+                <a:noAutofit/>
+              </a:bodyPr>
+              <a:lstStyle/>
+              <a:p>
+                <a:pPr algn="ctr"/>
+                <a:r>
+                  <a:rPr lang="en-US" sz="1400" b="1" dirty="0"/>
+                  <a:t>WAIT </a:t>
+                </a:r>
+              </a:p>
+              <a:p>
+                <a:pPr algn="ctr"/>
+                <a:r>
+                  <a:rPr lang="en-US" sz="1400" b="1" dirty="0"/>
+                  <a:t>VSYNC</a:t>
+                </a:r>
+              </a:p>
+            </p:txBody>
+          </p:sp>
+          <p:sp>
+            <p:nvSpPr>
+              <p:cNvPr id="15" name="Oval 14">
+                <a:extLst>
+                  <a:ext uri="{FF2B5EF4-FFF2-40B4-BE49-F238E27FC236}">
+                    <a16:creationId xmlns:a16="http://schemas.microsoft.com/office/drawing/2014/main" id="{8FFD4518-97ED-4320-95F8-4CA157F59A7F}"/>
+                  </a:ext>
+                </a:extLst>
+              </p:cNvPr>
+              <p:cNvSpPr/>
+              <p:nvPr/>
+            </p:nvSpPr>
+            <p:spPr>
+              <a:xfrm>
+                <a:off x="10519280" y="1439535"/>
+                <a:ext cx="837282" cy="859315"/>
+              </a:xfrm>
+              <a:prstGeom prst="ellipse">
+                <a:avLst/>
+              </a:prstGeom>
+            </p:spPr>
+            <p:style>
+              <a:lnRef idx="2">
+                <a:schemeClr val="accent2">
+                  <a:shade val="50000"/>
+                </a:schemeClr>
+              </a:lnRef>
+              <a:fillRef idx="1">
+                <a:schemeClr val="accent2"/>
+              </a:fillRef>
+              <a:effectRef idx="0">
+                <a:schemeClr val="accent2"/>
+              </a:effectRef>
+              <a:fontRef idx="minor">
+                <a:schemeClr val="lt1"/>
+              </a:fontRef>
+            </p:style>
+            <p:txBody>
+              <a:bodyPr wrap="none" rtlCol="0" anchor="ctr">
+                <a:noAutofit/>
+              </a:bodyPr>
+              <a:lstStyle/>
+              <a:p>
+                <a:pPr algn="ctr"/>
+                <a:r>
+                  <a:rPr lang="en-US" sz="1400" b="1" dirty="0"/>
+                  <a:t>RX0</a:t>
+                </a:r>
+              </a:p>
+            </p:txBody>
+          </p:sp>
+          <p:sp>
+            <p:nvSpPr>
+              <p:cNvPr id="16" name="Oval 15">
+                <a:extLst>
+                  <a:ext uri="{FF2B5EF4-FFF2-40B4-BE49-F238E27FC236}">
+                    <a16:creationId xmlns:a16="http://schemas.microsoft.com/office/drawing/2014/main" id="{5B9A06AF-48FF-4241-BD8E-6A6B0D588FA1}"/>
+                  </a:ext>
+                </a:extLst>
+              </p:cNvPr>
+              <p:cNvSpPr/>
+              <p:nvPr/>
+            </p:nvSpPr>
+            <p:spPr>
+              <a:xfrm>
+                <a:off x="11980859" y="1439533"/>
+                <a:ext cx="837282" cy="859315"/>
+              </a:xfrm>
+              <a:prstGeom prst="ellipse">
+                <a:avLst/>
+              </a:prstGeom>
+            </p:spPr>
+            <p:style>
+              <a:lnRef idx="2">
+                <a:schemeClr val="accent2">
+                  <a:shade val="50000"/>
+                </a:schemeClr>
+              </a:lnRef>
+              <a:fillRef idx="1">
+                <a:schemeClr val="accent2"/>
+              </a:fillRef>
+              <a:effectRef idx="0">
+                <a:schemeClr val="accent2"/>
+              </a:effectRef>
+              <a:fontRef idx="minor">
+                <a:schemeClr val="lt1"/>
+              </a:fontRef>
+            </p:style>
+            <p:txBody>
+              <a:bodyPr wrap="none" rtlCol="0" anchor="ctr">
+                <a:noAutofit/>
+              </a:bodyPr>
+              <a:lstStyle/>
+              <a:p>
+                <a:pPr algn="ctr"/>
+                <a:r>
+                  <a:rPr lang="en-US" sz="1400" b="1" dirty="0"/>
+                  <a:t>RX7</a:t>
+                </a:r>
+              </a:p>
+            </p:txBody>
+          </p:sp>
+          <p:cxnSp>
+            <p:nvCxnSpPr>
+              <p:cNvPr id="18" name="Straight Arrow Connector 17">
+                <a:extLst>
+                  <a:ext uri="{FF2B5EF4-FFF2-40B4-BE49-F238E27FC236}">
+                    <a16:creationId xmlns:a16="http://schemas.microsoft.com/office/drawing/2014/main" id="{44AB1B13-F3DA-4225-B1BB-327EBF3707AA}"/>
+                  </a:ext>
+                </a:extLst>
+              </p:cNvPr>
+              <p:cNvCxnSpPr>
+                <a:stCxn id="5" idx="6"/>
+                <a:endCxn id="11" idx="2"/>
+              </p:cNvCxnSpPr>
+              <p:nvPr/>
+            </p:nvCxnSpPr>
+            <p:spPr>
+              <a:xfrm>
+                <a:off x="927252" y="1869196"/>
+                <a:ext cx="205649" cy="1"/>
+              </a:xfrm>
+              <a:prstGeom prst="straightConnector1">
+                <a:avLst/>
+              </a:prstGeom>
+              <a:ln w="38100">
+                <a:tailEnd type="triangle"/>
+              </a:ln>
+            </p:spPr>
+            <p:style>
+              <a:lnRef idx="1">
+                <a:schemeClr val="accent1"/>
+              </a:lnRef>
+              <a:fillRef idx="0">
+                <a:schemeClr val="accent1"/>
+              </a:fillRef>
+              <a:effectRef idx="0">
+                <a:schemeClr val="accent1"/>
+              </a:effectRef>
+              <a:fontRef idx="minor">
+                <a:schemeClr val="tx1"/>
+              </a:fontRef>
+            </p:style>
+          </p:cxnSp>
+          <p:cxnSp>
+            <p:nvCxnSpPr>
+              <p:cNvPr id="19" name="Straight Arrow Connector 18">
+                <a:extLst>
+                  <a:ext uri="{FF2B5EF4-FFF2-40B4-BE49-F238E27FC236}">
+                    <a16:creationId xmlns:a16="http://schemas.microsoft.com/office/drawing/2014/main" id="{9A0436B0-474A-45C4-BF99-80B3E48E8827}"/>
+                  </a:ext>
+                </a:extLst>
+              </p:cNvPr>
+              <p:cNvCxnSpPr/>
+              <p:nvPr/>
+            </p:nvCxnSpPr>
+            <p:spPr>
+              <a:xfrm>
+                <a:off x="1970183" y="1869191"/>
+                <a:ext cx="205649" cy="1"/>
+              </a:xfrm>
+              <a:prstGeom prst="straightConnector1">
+                <a:avLst/>
+              </a:prstGeom>
+              <a:ln w="38100">
+                <a:tailEnd type="triangle"/>
+              </a:ln>
+            </p:spPr>
+            <p:style>
+              <a:lnRef idx="1">
+                <a:schemeClr val="accent1"/>
+              </a:lnRef>
+              <a:fillRef idx="0">
+                <a:schemeClr val="accent1"/>
+              </a:fillRef>
+              <a:effectRef idx="0">
+                <a:schemeClr val="accent1"/>
+              </a:effectRef>
+              <a:fontRef idx="minor">
+                <a:schemeClr val="tx1"/>
+              </a:fontRef>
+            </p:style>
+          </p:cxnSp>
+          <p:cxnSp>
+            <p:nvCxnSpPr>
+              <p:cNvPr id="20" name="Straight Arrow Connector 19">
+                <a:extLst>
+                  <a:ext uri="{FF2B5EF4-FFF2-40B4-BE49-F238E27FC236}">
+                    <a16:creationId xmlns:a16="http://schemas.microsoft.com/office/drawing/2014/main" id="{625BAF95-62F8-4402-B221-6CE70C88AD2E}"/>
+                  </a:ext>
+                </a:extLst>
+              </p:cNvPr>
+              <p:cNvCxnSpPr/>
+              <p:nvPr/>
+            </p:nvCxnSpPr>
+            <p:spPr>
+              <a:xfrm>
+                <a:off x="3013114" y="1904070"/>
+                <a:ext cx="205649" cy="1"/>
+              </a:xfrm>
+              <a:prstGeom prst="straightConnector1">
+                <a:avLst/>
+              </a:prstGeom>
+              <a:ln w="38100">
+                <a:tailEnd type="triangle"/>
+              </a:ln>
+            </p:spPr>
+            <p:style>
+              <a:lnRef idx="1">
+                <a:schemeClr val="accent1"/>
+              </a:lnRef>
+              <a:fillRef idx="0">
+                <a:schemeClr val="accent1"/>
+              </a:fillRef>
+              <a:effectRef idx="0">
+                <a:schemeClr val="accent1"/>
+              </a:effectRef>
+              <a:fontRef idx="minor">
+                <a:schemeClr val="tx1"/>
+              </a:fontRef>
+            </p:style>
+          </p:cxnSp>
+          <p:cxnSp>
+            <p:nvCxnSpPr>
+              <p:cNvPr id="21" name="Straight Arrow Connector 20">
+                <a:extLst>
+                  <a:ext uri="{FF2B5EF4-FFF2-40B4-BE49-F238E27FC236}">
+                    <a16:creationId xmlns:a16="http://schemas.microsoft.com/office/drawing/2014/main" id="{8D2EFE4E-F8CC-4BC5-9080-906D21E75616}"/>
+                  </a:ext>
+                </a:extLst>
+              </p:cNvPr>
+              <p:cNvCxnSpPr/>
+              <p:nvPr/>
+            </p:nvCxnSpPr>
+            <p:spPr>
+              <a:xfrm>
+                <a:off x="4056045" y="1904065"/>
+                <a:ext cx="205649" cy="1"/>
+              </a:xfrm>
+              <a:prstGeom prst="straightConnector1">
+                <a:avLst/>
+              </a:prstGeom>
+              <a:ln w="38100">
+                <a:tailEnd type="triangle"/>
+              </a:ln>
+            </p:spPr>
+            <p:style>
+              <a:lnRef idx="1">
+                <a:schemeClr val="accent1"/>
+              </a:lnRef>
+              <a:fillRef idx="0">
+                <a:schemeClr val="accent1"/>
+              </a:fillRef>
+              <a:effectRef idx="0">
+                <a:schemeClr val="accent1"/>
+              </a:effectRef>
+              <a:fontRef idx="minor">
+                <a:schemeClr val="tx1"/>
+              </a:fontRef>
+            </p:style>
+          </p:cxnSp>
+          <p:cxnSp>
+            <p:nvCxnSpPr>
+              <p:cNvPr id="22" name="Straight Arrow Connector 21">
+                <a:extLst>
+                  <a:ext uri="{FF2B5EF4-FFF2-40B4-BE49-F238E27FC236}">
+                    <a16:creationId xmlns:a16="http://schemas.microsoft.com/office/drawing/2014/main" id="{408E56BA-960E-444C-A2CD-0BA8446020A1}"/>
+                  </a:ext>
+                </a:extLst>
+              </p:cNvPr>
+              <p:cNvCxnSpPr/>
+              <p:nvPr/>
+            </p:nvCxnSpPr>
+            <p:spPr>
+              <a:xfrm>
+                <a:off x="5098976" y="1910496"/>
+                <a:ext cx="205649" cy="1"/>
+              </a:xfrm>
+              <a:prstGeom prst="straightConnector1">
+                <a:avLst/>
+              </a:prstGeom>
+              <a:ln w="38100">
+                <a:tailEnd type="triangle"/>
+              </a:ln>
+            </p:spPr>
+            <p:style>
+              <a:lnRef idx="1">
+                <a:schemeClr val="accent1"/>
+              </a:lnRef>
+              <a:fillRef idx="0">
+                <a:schemeClr val="accent1"/>
+              </a:fillRef>
+              <a:effectRef idx="0">
+                <a:schemeClr val="accent1"/>
+              </a:effectRef>
+              <a:fontRef idx="minor">
+                <a:schemeClr val="tx1"/>
+              </a:fontRef>
+            </p:style>
+          </p:cxnSp>
+          <p:cxnSp>
+            <p:nvCxnSpPr>
+              <p:cNvPr id="23" name="Straight Arrow Connector 22">
+                <a:extLst>
+                  <a:ext uri="{FF2B5EF4-FFF2-40B4-BE49-F238E27FC236}">
+                    <a16:creationId xmlns:a16="http://schemas.microsoft.com/office/drawing/2014/main" id="{53E5EC68-57F7-4D2A-AD3C-0C75C0A8AE43}"/>
+                  </a:ext>
+                </a:extLst>
+              </p:cNvPr>
+              <p:cNvCxnSpPr/>
+              <p:nvPr/>
+            </p:nvCxnSpPr>
+            <p:spPr>
+              <a:xfrm>
+                <a:off x="6141907" y="1910491"/>
+                <a:ext cx="205649" cy="1"/>
+              </a:xfrm>
+              <a:prstGeom prst="straightConnector1">
+                <a:avLst/>
+              </a:prstGeom>
+              <a:ln w="38100">
+                <a:tailEnd type="triangle"/>
+              </a:ln>
+            </p:spPr>
+            <p:style>
+              <a:lnRef idx="1">
+                <a:schemeClr val="accent1"/>
+              </a:lnRef>
+              <a:fillRef idx="0">
+                <a:schemeClr val="accent1"/>
+              </a:fillRef>
+              <a:effectRef idx="0">
+                <a:schemeClr val="accent1"/>
+              </a:effectRef>
+              <a:fontRef idx="minor">
+                <a:schemeClr val="tx1"/>
+              </a:fontRef>
+            </p:style>
+          </p:cxnSp>
+          <p:cxnSp>
+            <p:nvCxnSpPr>
+              <p:cNvPr id="24" name="Straight Arrow Connector 23">
+                <a:extLst>
+                  <a:ext uri="{FF2B5EF4-FFF2-40B4-BE49-F238E27FC236}">
+                    <a16:creationId xmlns:a16="http://schemas.microsoft.com/office/drawing/2014/main" id="{D90B44CC-5FEE-49FA-ADE8-5617458FBD92}"/>
+                  </a:ext>
+                </a:extLst>
+              </p:cNvPr>
+              <p:cNvCxnSpPr/>
+              <p:nvPr/>
+            </p:nvCxnSpPr>
+            <p:spPr>
+              <a:xfrm>
+                <a:off x="7184838" y="1945370"/>
+                <a:ext cx="205649" cy="1"/>
+              </a:xfrm>
+              <a:prstGeom prst="straightConnector1">
+                <a:avLst/>
+              </a:prstGeom>
+              <a:ln w="38100">
+                <a:tailEnd type="triangle"/>
+              </a:ln>
+            </p:spPr>
+            <p:style>
+              <a:lnRef idx="1">
+                <a:schemeClr val="accent1"/>
+              </a:lnRef>
+              <a:fillRef idx="0">
+                <a:schemeClr val="accent1"/>
+              </a:fillRef>
+              <a:effectRef idx="0">
+                <a:schemeClr val="accent1"/>
+              </a:effectRef>
+              <a:fontRef idx="minor">
+                <a:schemeClr val="tx1"/>
+              </a:fontRef>
+            </p:style>
+          </p:cxnSp>
+          <p:cxnSp>
+            <p:nvCxnSpPr>
+              <p:cNvPr id="25" name="Straight Arrow Connector 24">
+                <a:extLst>
+                  <a:ext uri="{FF2B5EF4-FFF2-40B4-BE49-F238E27FC236}">
+                    <a16:creationId xmlns:a16="http://schemas.microsoft.com/office/drawing/2014/main" id="{C46A39EC-FD78-43B3-A0EC-1F48B77F7D5A}"/>
+                  </a:ext>
+                </a:extLst>
+              </p:cNvPr>
+              <p:cNvCxnSpPr/>
+              <p:nvPr/>
+            </p:nvCxnSpPr>
+            <p:spPr>
+              <a:xfrm>
+                <a:off x="8227769" y="1945365"/>
+                <a:ext cx="205649" cy="1"/>
+              </a:xfrm>
+              <a:prstGeom prst="straightConnector1">
+                <a:avLst/>
+              </a:prstGeom>
+              <a:ln w="38100">
+                <a:tailEnd type="triangle"/>
+              </a:ln>
+            </p:spPr>
+            <p:style>
+              <a:lnRef idx="1">
+                <a:schemeClr val="accent1"/>
+              </a:lnRef>
+              <a:fillRef idx="0">
+                <a:schemeClr val="accent1"/>
+              </a:fillRef>
+              <a:effectRef idx="0">
+                <a:schemeClr val="accent1"/>
+              </a:effectRef>
+              <a:fontRef idx="minor">
+                <a:schemeClr val="tx1"/>
+              </a:fontRef>
+            </p:style>
+          </p:cxnSp>
+          <p:cxnSp>
+            <p:nvCxnSpPr>
+              <p:cNvPr id="26" name="Straight Arrow Connector 25">
+                <a:extLst>
+                  <a:ext uri="{FF2B5EF4-FFF2-40B4-BE49-F238E27FC236}">
+                    <a16:creationId xmlns:a16="http://schemas.microsoft.com/office/drawing/2014/main" id="{C6CE95B6-3952-4CD2-8AA6-3FDA34A73D5B}"/>
+                  </a:ext>
+                </a:extLst>
+              </p:cNvPr>
+              <p:cNvCxnSpPr/>
+              <p:nvPr/>
+            </p:nvCxnSpPr>
+            <p:spPr>
+              <a:xfrm>
+                <a:off x="9278050" y="1886638"/>
+                <a:ext cx="205649" cy="1"/>
+              </a:xfrm>
+              <a:prstGeom prst="straightConnector1">
+                <a:avLst/>
+              </a:prstGeom>
+              <a:ln w="38100">
+                <a:tailEnd type="triangle"/>
+              </a:ln>
+            </p:spPr>
+            <p:style>
+              <a:lnRef idx="1">
+                <a:schemeClr val="accent1"/>
+              </a:lnRef>
+              <a:fillRef idx="0">
+                <a:schemeClr val="accent1"/>
+              </a:fillRef>
+              <a:effectRef idx="0">
+                <a:schemeClr val="accent1"/>
+              </a:effectRef>
+              <a:fontRef idx="minor">
+                <a:schemeClr val="tx1"/>
+              </a:fontRef>
+            </p:style>
+          </p:cxnSp>
+          <p:cxnSp>
+            <p:nvCxnSpPr>
+              <p:cNvPr id="27" name="Straight Arrow Connector 26">
+                <a:extLst>
+                  <a:ext uri="{FF2B5EF4-FFF2-40B4-BE49-F238E27FC236}">
+                    <a16:creationId xmlns:a16="http://schemas.microsoft.com/office/drawing/2014/main" id="{80DCBD2D-D410-4680-AC23-8D318D379B9F}"/>
+                  </a:ext>
+                </a:extLst>
+              </p:cNvPr>
+              <p:cNvCxnSpPr/>
+              <p:nvPr/>
+            </p:nvCxnSpPr>
+            <p:spPr>
+              <a:xfrm>
+                <a:off x="10320981" y="1886633"/>
+                <a:ext cx="205649" cy="1"/>
+              </a:xfrm>
+              <a:prstGeom prst="straightConnector1">
+                <a:avLst/>
+              </a:prstGeom>
+              <a:ln w="38100">
+                <a:tailEnd type="triangle"/>
+              </a:ln>
+            </p:spPr>
+            <p:style>
+              <a:lnRef idx="1">
+                <a:schemeClr val="accent1"/>
+              </a:lnRef>
+              <a:fillRef idx="0">
+                <a:schemeClr val="accent1"/>
+              </a:fillRef>
+              <a:effectRef idx="0">
+                <a:schemeClr val="accent1"/>
+              </a:effectRef>
+              <a:fontRef idx="minor">
+                <a:schemeClr val="tx1"/>
+              </a:fontRef>
+            </p:style>
+          </p:cxnSp>
+          <p:cxnSp>
+            <p:nvCxnSpPr>
+              <p:cNvPr id="28" name="Straight Arrow Connector 27">
+                <a:extLst>
+                  <a:ext uri="{FF2B5EF4-FFF2-40B4-BE49-F238E27FC236}">
+                    <a16:creationId xmlns:a16="http://schemas.microsoft.com/office/drawing/2014/main" id="{50C84CFB-D164-4A29-83D3-886EA3467BF6}"/>
+                  </a:ext>
+                </a:extLst>
+              </p:cNvPr>
+              <p:cNvCxnSpPr>
+                <a:cxnSpLocks/>
+                <a:stCxn id="15" idx="6"/>
+                <a:endCxn id="16" idx="2"/>
+              </p:cNvCxnSpPr>
+              <p:nvPr/>
+            </p:nvCxnSpPr>
+            <p:spPr>
+              <a:xfrm flipV="1">
+                <a:off x="11356562" y="1869191"/>
+                <a:ext cx="624297" cy="2"/>
+              </a:xfrm>
+              <a:prstGeom prst="straightConnector1">
+                <a:avLst/>
+              </a:prstGeom>
+              <a:ln w="38100">
+                <a:prstDash val="sysDot"/>
+                <a:tailEnd type="triangle"/>
+              </a:ln>
+            </p:spPr>
+            <p:style>
+              <a:lnRef idx="1">
+                <a:schemeClr val="accent1"/>
+              </a:lnRef>
+              <a:fillRef idx="0">
+                <a:schemeClr val="accent1"/>
+              </a:fillRef>
+              <a:effectRef idx="0">
+                <a:schemeClr val="accent1"/>
+              </a:effectRef>
+              <a:fontRef idx="minor">
+                <a:schemeClr val="tx1"/>
+              </a:fontRef>
+            </p:style>
+          </p:cxnSp>
+          <p:sp>
+            <p:nvSpPr>
+              <p:cNvPr id="37" name="TextBox 36">
+                <a:extLst>
+                  <a:ext uri="{FF2B5EF4-FFF2-40B4-BE49-F238E27FC236}">
+                    <a16:creationId xmlns:a16="http://schemas.microsoft.com/office/drawing/2014/main" id="{FE105BC9-2A65-42CD-B710-A43BAC7FB353}"/>
+                  </a:ext>
+                </a:extLst>
+              </p:cNvPr>
+              <p:cNvSpPr txBox="1"/>
+              <p:nvPr/>
+            </p:nvSpPr>
+            <p:spPr>
+              <a:xfrm>
+                <a:off x="1790743" y="980538"/>
+                <a:ext cx="1428020" cy="276999"/>
+              </a:xfrm>
+              <a:prstGeom prst="rect">
+                <a:avLst/>
+              </a:prstGeom>
+              <a:noFill/>
+            </p:spPr>
+            <p:txBody>
+              <a:bodyPr wrap="none" rtlCol="0">
+                <a:spAutoFit/>
+              </a:bodyPr>
+              <a:lstStyle/>
+              <a:p>
+                <a:r>
+                  <a:rPr lang="en-US" sz="1200" dirty="0">
+                    <a:solidFill>
+                      <a:srgbClr val="DE0000"/>
+                    </a:solidFill>
+                  </a:rPr>
+                  <a:t>Test Signal Wrong</a:t>
+                </a:r>
+              </a:p>
+            </p:txBody>
+          </p:sp>
+          <p:cxnSp>
+            <p:nvCxnSpPr>
+              <p:cNvPr id="43" name="Connector: Curved 42">
+                <a:extLst>
+                  <a:ext uri="{FF2B5EF4-FFF2-40B4-BE49-F238E27FC236}">
+                    <a16:creationId xmlns:a16="http://schemas.microsoft.com/office/drawing/2014/main" id="{D22D98F0-FF36-4499-82AB-0F66CE3DEF31}"/>
+                  </a:ext>
+                </a:extLst>
+              </p:cNvPr>
+              <p:cNvCxnSpPr>
+                <a:stCxn id="8" idx="1"/>
+                <a:endCxn id="5" idx="7"/>
+              </p:cNvCxnSpPr>
+              <p:nvPr/>
+            </p:nvCxnSpPr>
+            <p:spPr>
+              <a:xfrm rot="16200000" flipH="1" flipV="1">
+                <a:off x="2594472" y="-224457"/>
+                <a:ext cx="2" cy="3579676"/>
+              </a:xfrm>
+              <a:prstGeom prst="curvedConnector3">
+                <a:avLst>
+                  <a:gd name="adj1" fmla="val -17722200000"/>
+                </a:avLst>
+              </a:prstGeom>
+              <a:ln w="12700">
+                <a:tailEnd type="triangle"/>
+              </a:ln>
+            </p:spPr>
+            <p:style>
+              <a:lnRef idx="1">
+                <a:schemeClr val="accent1"/>
+              </a:lnRef>
+              <a:fillRef idx="0">
+                <a:schemeClr val="accent1"/>
+              </a:fillRef>
+              <a:effectRef idx="0">
+                <a:schemeClr val="accent1"/>
+              </a:effectRef>
+              <a:fontRef idx="minor">
+                <a:schemeClr val="tx1"/>
+              </a:fontRef>
+            </p:style>
+          </p:cxnSp>
+          <p:cxnSp>
+            <p:nvCxnSpPr>
+              <p:cNvPr id="45" name="Connector: Curved 44">
+                <a:extLst>
+                  <a:ext uri="{FF2B5EF4-FFF2-40B4-BE49-F238E27FC236}">
+                    <a16:creationId xmlns:a16="http://schemas.microsoft.com/office/drawing/2014/main" id="{32444198-6880-406C-8CD1-10493F159DE9}"/>
+                  </a:ext>
+                </a:extLst>
+              </p:cNvPr>
+              <p:cNvCxnSpPr>
+                <a:cxnSpLocks/>
+                <a:stCxn id="12" idx="1"/>
+                <a:endCxn id="5" idx="0"/>
+              </p:cNvCxnSpPr>
+              <p:nvPr/>
+            </p:nvCxnSpPr>
+            <p:spPr>
+              <a:xfrm rot="16200000" flipV="1">
+                <a:off x="3947937" y="-1999788"/>
+                <a:ext cx="125842" cy="7004493"/>
+              </a:xfrm>
+              <a:prstGeom prst="curvedConnector3">
+                <a:avLst>
+                  <a:gd name="adj1" fmla="val 693121"/>
+                </a:avLst>
+              </a:prstGeom>
+              <a:ln w="12700">
+                <a:tailEnd type="triangle"/>
+              </a:ln>
+            </p:spPr>
+            <p:style>
+              <a:lnRef idx="1">
+                <a:schemeClr val="accent1"/>
+              </a:lnRef>
+              <a:fillRef idx="0">
+                <a:schemeClr val="accent1"/>
+              </a:fillRef>
+              <a:effectRef idx="0">
+                <a:schemeClr val="accent1"/>
+              </a:effectRef>
+              <a:fontRef idx="minor">
+                <a:schemeClr val="tx1"/>
+              </a:fontRef>
+            </p:style>
+          </p:cxnSp>
+          <p:sp>
+            <p:nvSpPr>
+              <p:cNvPr id="47" name="TextBox 46">
+                <a:extLst>
+                  <a:ext uri="{FF2B5EF4-FFF2-40B4-BE49-F238E27FC236}">
+                    <a16:creationId xmlns:a16="http://schemas.microsoft.com/office/drawing/2014/main" id="{DE7907EC-D030-430F-8CFF-5DB2B33B70C8}"/>
+                  </a:ext>
+                </a:extLst>
+              </p:cNvPr>
+              <p:cNvSpPr txBox="1"/>
+              <p:nvPr/>
+            </p:nvSpPr>
+            <p:spPr>
+              <a:xfrm>
+                <a:off x="3287203" y="703539"/>
+                <a:ext cx="1445076" cy="276999"/>
+              </a:xfrm>
+              <a:prstGeom prst="rect">
+                <a:avLst/>
+              </a:prstGeom>
+              <a:noFill/>
+            </p:spPr>
+            <p:txBody>
+              <a:bodyPr wrap="none" rtlCol="0">
+                <a:spAutoFit/>
+              </a:bodyPr>
+              <a:lstStyle/>
+              <a:p>
+                <a:r>
+                  <a:rPr lang="en-US" sz="1200" dirty="0">
+                    <a:solidFill>
+                      <a:srgbClr val="DE0000"/>
+                    </a:solidFill>
+                  </a:rPr>
+                  <a:t>Encoder ID Wrong</a:t>
+                </a:r>
+              </a:p>
+            </p:txBody>
+          </p:sp>
+          <p:cxnSp>
+            <p:nvCxnSpPr>
+              <p:cNvPr id="52" name="Connector: Curved 51">
+                <a:extLst>
+                  <a:ext uri="{FF2B5EF4-FFF2-40B4-BE49-F238E27FC236}">
+                    <a16:creationId xmlns:a16="http://schemas.microsoft.com/office/drawing/2014/main" id="{9799F668-8A01-4CF5-9AFB-7C7800EEF99C}"/>
+                  </a:ext>
+                </a:extLst>
+              </p:cNvPr>
+              <p:cNvCxnSpPr>
+                <a:stCxn id="16" idx="1"/>
+                <a:endCxn id="15" idx="7"/>
+              </p:cNvCxnSpPr>
+              <p:nvPr/>
+            </p:nvCxnSpPr>
+            <p:spPr>
+              <a:xfrm rot="16200000" flipH="1" flipV="1">
+                <a:off x="11668710" y="1130612"/>
+                <a:ext cx="2" cy="869531"/>
+              </a:xfrm>
+              <a:prstGeom prst="curvedConnector3">
+                <a:avLst>
+                  <a:gd name="adj1" fmla="val -17722200000"/>
+                </a:avLst>
+              </a:prstGeom>
+              <a:ln w="12700">
+                <a:tailEnd type="triangle"/>
+              </a:ln>
+            </p:spPr>
+            <p:style>
+              <a:lnRef idx="1">
+                <a:schemeClr val="accent1"/>
+              </a:lnRef>
+              <a:fillRef idx="0">
+                <a:schemeClr val="accent1"/>
+              </a:fillRef>
+              <a:effectRef idx="0">
+                <a:schemeClr val="accent1"/>
+              </a:effectRef>
+              <a:fontRef idx="minor">
+                <a:schemeClr val="tx1"/>
+              </a:fontRef>
+            </p:style>
+          </p:cxnSp>
+          <p:sp>
+            <p:nvSpPr>
+              <p:cNvPr id="53" name="TextBox 52">
+                <a:extLst>
+                  <a:ext uri="{FF2B5EF4-FFF2-40B4-BE49-F238E27FC236}">
+                    <a16:creationId xmlns:a16="http://schemas.microsoft.com/office/drawing/2014/main" id="{0BDE92BA-9EC0-4316-A091-4A99EA87EEFB}"/>
+                  </a:ext>
+                </a:extLst>
+              </p:cNvPr>
+              <p:cNvSpPr txBox="1"/>
+              <p:nvPr/>
+            </p:nvSpPr>
+            <p:spPr>
+              <a:xfrm>
+                <a:off x="11056800" y="2599829"/>
+                <a:ext cx="1350498" cy="276999"/>
+              </a:xfrm>
+              <a:prstGeom prst="rect">
+                <a:avLst/>
+              </a:prstGeom>
+              <a:noFill/>
+            </p:spPr>
+            <p:txBody>
+              <a:bodyPr wrap="none" rtlCol="0">
+                <a:spAutoFit/>
+              </a:bodyPr>
+              <a:lstStyle/>
+              <a:p>
+                <a:r>
+                  <a:rPr lang="en-US" sz="1200" dirty="0">
+                    <a:solidFill>
+                      <a:srgbClr val="DE0000"/>
+                    </a:solidFill>
+                  </a:rPr>
+                  <a:t>Normal Workflow</a:t>
+                </a:r>
+              </a:p>
+            </p:txBody>
+          </p:sp>
+          <p:sp>
+            <p:nvSpPr>
+              <p:cNvPr id="2" name="Left Brace 1">
+                <a:extLst>
+                  <a:ext uri="{FF2B5EF4-FFF2-40B4-BE49-F238E27FC236}">
+                    <a16:creationId xmlns:a16="http://schemas.microsoft.com/office/drawing/2014/main" id="{B38D6E13-8DF2-4958-A4C3-8FCE9D841017}"/>
+                  </a:ext>
+                </a:extLst>
+              </p:cNvPr>
+              <p:cNvSpPr/>
+              <p:nvPr/>
+            </p:nvSpPr>
+            <p:spPr>
+              <a:xfrm rot="16200000">
+                <a:off x="11644480" y="1343557"/>
+                <a:ext cx="175138" cy="2337405"/>
+              </a:xfrm>
+              <a:prstGeom prst="leftBrace">
+                <a:avLst/>
+              </a:prstGeom>
+            </p:spPr>
+            <p:style>
+              <a:lnRef idx="1">
+                <a:schemeClr val="accent1"/>
+              </a:lnRef>
+              <a:fillRef idx="0">
+                <a:schemeClr val="accent1"/>
+              </a:fillRef>
+              <a:effectRef idx="0">
+                <a:schemeClr val="accent1"/>
+              </a:effectRef>
+              <a:fontRef idx="minor">
+                <a:schemeClr val="tx1"/>
+              </a:fontRef>
+            </p:style>
+            <p:txBody>
+              <a:bodyPr rtlCol="0" anchor="ctr"/>
+              <a:lstStyle/>
+              <a:p>
+                <a:pPr algn="ctr"/>
+                <a:endParaRPr lang="en-US" dirty="0"/>
+              </a:p>
+            </p:txBody>
+          </p:sp>
+          <p:cxnSp>
+            <p:nvCxnSpPr>
+              <p:cNvPr id="4" name="Connector: Curved 3">
+                <a:extLst>
+                  <a:ext uri="{FF2B5EF4-FFF2-40B4-BE49-F238E27FC236}">
+                    <a16:creationId xmlns:a16="http://schemas.microsoft.com/office/drawing/2014/main" id="{B5C60F33-2640-4947-8BA4-121FE6FB53C3}"/>
+                  </a:ext>
+                </a:extLst>
+              </p:cNvPr>
+              <p:cNvCxnSpPr>
+                <a:stCxn id="12" idx="5"/>
+                <a:endCxn id="12" idx="3"/>
+              </p:cNvCxnSpPr>
+              <p:nvPr/>
+            </p:nvCxnSpPr>
+            <p:spPr>
+              <a:xfrm rot="5400000">
+                <a:off x="7809128" y="1876983"/>
+                <a:ext cx="12700" cy="592048"/>
+              </a:xfrm>
+              <a:prstGeom prst="curvedConnector3">
+                <a:avLst>
+                  <a:gd name="adj1" fmla="val 2790898"/>
+                </a:avLst>
+              </a:prstGeom>
+              <a:ln w="12700">
+                <a:tailEnd type="triangle"/>
+              </a:ln>
+            </p:spPr>
+            <p:style>
+              <a:lnRef idx="1">
+                <a:schemeClr val="accent1"/>
+              </a:lnRef>
+              <a:fillRef idx="0">
+                <a:schemeClr val="accent1"/>
+              </a:fillRef>
+              <a:effectRef idx="0">
+                <a:schemeClr val="accent1"/>
+              </a:effectRef>
+              <a:fontRef idx="minor">
+                <a:schemeClr val="tx1"/>
+              </a:fontRef>
+            </p:style>
+          </p:cxnSp>
+          <p:cxnSp>
+            <p:nvCxnSpPr>
+              <p:cNvPr id="29" name="Connector: Curved 28">
+                <a:extLst>
+                  <a:ext uri="{FF2B5EF4-FFF2-40B4-BE49-F238E27FC236}">
+                    <a16:creationId xmlns:a16="http://schemas.microsoft.com/office/drawing/2014/main" id="{3C9E206B-408D-4AFC-8D2B-89B917FB8191}"/>
+                  </a:ext>
+                </a:extLst>
+              </p:cNvPr>
+              <p:cNvCxnSpPr>
+                <a:stCxn id="14" idx="5"/>
+                <a:endCxn id="14" idx="3"/>
+              </p:cNvCxnSpPr>
+              <p:nvPr/>
+            </p:nvCxnSpPr>
+            <p:spPr>
+              <a:xfrm rot="5400000">
+                <a:off x="9894990" y="1876982"/>
+                <a:ext cx="12700" cy="592048"/>
+              </a:xfrm>
+              <a:prstGeom prst="curvedConnector3">
+                <a:avLst>
+                  <a:gd name="adj1" fmla="val 2790898"/>
+                </a:avLst>
+              </a:prstGeom>
+              <a:ln w="12700">
+                <a:tailEnd type="triangle"/>
+              </a:ln>
+            </p:spPr>
+            <p:style>
+              <a:lnRef idx="1">
+                <a:schemeClr val="accent1"/>
+              </a:lnRef>
+              <a:fillRef idx="0">
+                <a:schemeClr val="accent1"/>
+              </a:fillRef>
+              <a:effectRef idx="0">
+                <a:schemeClr val="accent1"/>
+              </a:effectRef>
+              <a:fontRef idx="minor">
+                <a:schemeClr val="tx1"/>
+              </a:fontRef>
+            </p:style>
+          </p:cxnSp>
+          <p:sp>
+            <p:nvSpPr>
+              <p:cNvPr id="36" name="TextBox 35">
+                <a:extLst>
+                  <a:ext uri="{FF2B5EF4-FFF2-40B4-BE49-F238E27FC236}">
+                    <a16:creationId xmlns:a16="http://schemas.microsoft.com/office/drawing/2014/main" id="{33517B57-164B-4E1C-9DF3-2F4F2334E0FD}"/>
+                  </a:ext>
+                </a:extLst>
+              </p:cNvPr>
+              <p:cNvSpPr txBox="1"/>
+              <p:nvPr/>
+            </p:nvSpPr>
+            <p:spPr>
+              <a:xfrm>
+                <a:off x="7265884" y="2579615"/>
+                <a:ext cx="1258678" cy="276999"/>
+              </a:xfrm>
+              <a:prstGeom prst="rect">
+                <a:avLst/>
+              </a:prstGeom>
+              <a:noFill/>
+            </p:spPr>
+            <p:txBody>
+              <a:bodyPr wrap="none" rtlCol="0">
+                <a:spAutoFit/>
+              </a:bodyPr>
+              <a:lstStyle/>
+              <a:p>
+                <a:r>
+                  <a:rPr lang="en-US" sz="1200" dirty="0">
+                    <a:solidFill>
+                      <a:srgbClr val="DE0000"/>
+                    </a:solidFill>
+                  </a:rPr>
+                  <a:t>enc_id(19) == 1</a:t>
+                </a:r>
+              </a:p>
+            </p:txBody>
+          </p:sp>
+        </p:grpSp>
+        <p:sp>
+          <p:nvSpPr>
+            <p:cNvPr id="31" name="Rectangle 30">
+              <a:extLst>
+                <a:ext uri="{FF2B5EF4-FFF2-40B4-BE49-F238E27FC236}">
+                  <a16:creationId xmlns:a16="http://schemas.microsoft.com/office/drawing/2014/main" id="{18B9B9D8-FDAF-4976-8C2A-DF4A8AC2DB9E}"/>
+                </a:ext>
+              </a:extLst>
+            </p:cNvPr>
+            <p:cNvSpPr/>
+            <p:nvPr/>
+          </p:nvSpPr>
+          <p:spPr>
+            <a:xfrm>
+              <a:off x="1632326" y="1295823"/>
+              <a:ext cx="1025822" cy="1095817"/>
+            </a:xfrm>
+            <a:prstGeom prst="rect">
+              <a:avLst/>
+            </a:prstGeom>
+            <a:noFill/>
+            <a:ln w="19050">
+              <a:solidFill>
+                <a:srgbClr val="DE0000"/>
+              </a:solidFill>
+              <a:prstDash val="dash"/>
+            </a:ln>
+          </p:spPr>
+          <p:style>
+            <a:lnRef idx="2">
+              <a:schemeClr val="accent1">
+                <a:shade val="50000"/>
+              </a:schemeClr>
+            </a:lnRef>
+            <a:fillRef idx="1">
+              <a:schemeClr val="accent1"/>
+            </a:fillRef>
+            <a:effectRef idx="0">
+              <a:schemeClr val="accent1"/>
+            </a:effectRef>
+            <a:fontRef idx="minor">
+              <a:schemeClr val="lt1"/>
+            </a:fontRef>
+          </p:style>
+          <p:txBody>
+            <a:bodyPr rtlCol="0" anchor="ctr"/>
+            <a:lstStyle/>
+            <a:p>
+              <a:pPr algn="ctr"/>
+              <a:endParaRPr lang="en-US" dirty="0"/>
+            </a:p>
+          </p:txBody>
+        </p:sp>
+        <p:sp>
+          <p:nvSpPr>
+            <p:cNvPr id="48" name="Rectangle 47">
+              <a:extLst>
+                <a:ext uri="{FF2B5EF4-FFF2-40B4-BE49-F238E27FC236}">
+                  <a16:creationId xmlns:a16="http://schemas.microsoft.com/office/drawing/2014/main" id="{8ED925D7-3963-478D-ACF6-7B9CD378F3E3}"/>
+                </a:ext>
+              </a:extLst>
+            </p:cNvPr>
+            <p:cNvSpPr/>
+            <p:nvPr/>
+          </p:nvSpPr>
+          <p:spPr>
+            <a:xfrm>
+              <a:off x="9958665" y="1295823"/>
+              <a:ext cx="1042930" cy="1095818"/>
+            </a:xfrm>
+            <a:prstGeom prst="rect">
+              <a:avLst/>
+            </a:prstGeom>
+            <a:noFill/>
+            <a:ln w="19050">
+              <a:solidFill>
+                <a:srgbClr val="DE0000"/>
+              </a:solidFill>
+              <a:prstDash val="dash"/>
+            </a:ln>
+          </p:spPr>
+          <p:style>
+            <a:lnRef idx="2">
+              <a:schemeClr val="accent1">
+                <a:shade val="50000"/>
+              </a:schemeClr>
+            </a:lnRef>
+            <a:fillRef idx="1">
+              <a:schemeClr val="accent1"/>
+            </a:fillRef>
+            <a:effectRef idx="0">
+              <a:schemeClr val="accent1"/>
+            </a:effectRef>
+            <a:fontRef idx="minor">
+              <a:schemeClr val="lt1"/>
+            </a:fontRef>
+          </p:style>
+          <p:txBody>
+            <a:bodyPr rtlCol="0" anchor="ctr"/>
+            <a:lstStyle/>
+            <a:p>
+              <a:pPr algn="ctr"/>
+              <a:endParaRPr lang="en-US" dirty="0"/>
+            </a:p>
+          </p:txBody>
+        </p:sp>
+        <p:sp>
+          <p:nvSpPr>
+            <p:cNvPr id="32" name="TextBox 31">
+              <a:extLst>
+                <a:ext uri="{FF2B5EF4-FFF2-40B4-BE49-F238E27FC236}">
+                  <a16:creationId xmlns:a16="http://schemas.microsoft.com/office/drawing/2014/main" id="{6E12E829-81AF-488E-AD8F-4698353ABE89}"/>
+                </a:ext>
+              </a:extLst>
+            </p:cNvPr>
+            <p:cNvSpPr txBox="1"/>
+            <p:nvPr/>
+          </p:nvSpPr>
+          <p:spPr>
+            <a:xfrm>
+              <a:off x="1595653" y="871916"/>
+              <a:ext cx="1075936" cy="246221"/>
+            </a:xfrm>
+            <a:prstGeom prst="rect">
+              <a:avLst/>
+            </a:prstGeom>
+            <a:noFill/>
+          </p:spPr>
+          <p:txBody>
+            <a:bodyPr wrap="none" rtlCol="0">
+              <a:spAutoFit/>
+            </a:bodyPr>
+            <a:lstStyle/>
+            <a:p>
+              <a:r>
+                <a:rPr lang="en-US" sz="1000" dirty="0">
+                  <a:solidFill>
+                    <a:srgbClr val="DE0000"/>
+                  </a:solidFill>
+                </a:rPr>
+                <a:t>Additional State</a:t>
+              </a:r>
+            </a:p>
+          </p:txBody>
+        </p:sp>
+        <p:sp>
+          <p:nvSpPr>
+            <p:cNvPr id="49" name="TextBox 48">
+              <a:extLst>
+                <a:ext uri="{FF2B5EF4-FFF2-40B4-BE49-F238E27FC236}">
+                  <a16:creationId xmlns:a16="http://schemas.microsoft.com/office/drawing/2014/main" id="{CA900439-371D-4283-8EBA-2B9E1F0D8C45}"/>
+                </a:ext>
+              </a:extLst>
+            </p:cNvPr>
+            <p:cNvSpPr txBox="1"/>
+            <p:nvPr/>
+          </p:nvSpPr>
+          <p:spPr>
+            <a:xfrm>
+              <a:off x="9955604" y="1042772"/>
+              <a:ext cx="1075936" cy="246221"/>
+            </a:xfrm>
+            <a:prstGeom prst="rect">
+              <a:avLst/>
+            </a:prstGeom>
+            <a:noFill/>
+          </p:spPr>
+          <p:txBody>
+            <a:bodyPr wrap="none" rtlCol="0">
+              <a:spAutoFit/>
+            </a:bodyPr>
+            <a:lstStyle/>
+            <a:p>
+              <a:r>
+                <a:rPr lang="en-US" sz="1000" dirty="0">
+                  <a:solidFill>
+                    <a:srgbClr val="DE0000"/>
+                  </a:solidFill>
+                </a:rPr>
+                <a:t>Additional State</a:t>
+              </a:r>
+            </a:p>
+          </p:txBody>
+        </p:sp>
+        <p:sp>
+          <p:nvSpPr>
+            <p:cNvPr id="50" name="TextBox 49">
+              <a:extLst>
+                <a:ext uri="{FF2B5EF4-FFF2-40B4-BE49-F238E27FC236}">
+                  <a16:creationId xmlns:a16="http://schemas.microsoft.com/office/drawing/2014/main" id="{9DEC4178-327A-47FB-893B-B053BDF7C369}"/>
+                </a:ext>
+              </a:extLst>
+            </p:cNvPr>
+            <p:cNvSpPr txBox="1"/>
+            <p:nvPr/>
+          </p:nvSpPr>
+          <p:spPr>
+            <a:xfrm>
+              <a:off x="11114606" y="2541294"/>
+              <a:ext cx="881973" cy="276999"/>
+            </a:xfrm>
+            <a:prstGeom prst="rect">
+              <a:avLst/>
+            </a:prstGeom>
+            <a:noFill/>
+          </p:spPr>
+          <p:txBody>
+            <a:bodyPr wrap="none" rtlCol="0">
+              <a:spAutoFit/>
+            </a:bodyPr>
+            <a:lstStyle/>
+            <a:p>
+              <a:r>
+                <a:rPr lang="en-US" sz="1200" dirty="0">
+                  <a:solidFill>
+                    <a:srgbClr val="DE0000"/>
+                  </a:solidFill>
+                </a:rPr>
+                <a:t>vsync != 1</a:t>
+              </a:r>
+            </a:p>
+          </p:txBody>
+        </p:sp>
+      </p:grpSp>
+      <p:sp>
+        <p:nvSpPr>
+          <p:cNvPr id="35" name="Title 34">
+            <a:extLst>
+              <a:ext uri="{FF2B5EF4-FFF2-40B4-BE49-F238E27FC236}">
+                <a16:creationId xmlns:a16="http://schemas.microsoft.com/office/drawing/2014/main" id="{026C72EB-A5B7-4F89-9DA7-C2E3ACCB1039}"/>
+              </a:ext>
+            </a:extLst>
+          </p:cNvPr>
+          <p:cNvSpPr>
+            <a:spLocks noGrp="1"/>
+          </p:cNvSpPr>
+          <p:nvPr>
+            <p:ph type="title"/>
+          </p:nvPr>
+        </p:nvSpPr>
+        <p:spPr>
+          <a:xfrm>
+            <a:off x="731520" y="328320"/>
+            <a:ext cx="13167000" cy="691109"/>
+          </a:xfrm>
+        </p:spPr>
+        <p:txBody>
+          <a:bodyPr/>
+          <a:lstStyle/>
+          <a:p>
+            <a:r>
+              <a:rPr lang="en-US" dirty="0">
+                <a:solidFill>
+                  <a:srgbClr val="DE0000"/>
+                </a:solidFill>
+              </a:rPr>
+              <a:t>HDSL State Machine</a:t>
+            </a:r>
+          </a:p>
+        </p:txBody>
+      </p:sp>
+    </p:spTree>
+    <p:extLst>
+      <p:ext uri="{BB962C8B-B14F-4D97-AF65-F5344CB8AC3E}">
+        <p14:creationId xmlns:p14="http://schemas.microsoft.com/office/powerpoint/2010/main" val="2536151938"/>
+      </p:ext>
+    </p:extLst>
+  </p:cSld>
+  <p:clrMapOvr>
+    <a:masterClrMapping/>
+  </p:clrMapOvr>
+</p:sld>
+</file>
+
 <file path=ppt/theme/theme1.xml><?xml version="1.0" encoding="utf-8"?>
 <a:theme xmlns:a="http://schemas.openxmlformats.org/drawingml/2006/main" name="Office Theme">
   <a:themeElements>

</xml_diff>

<commit_message>
am243x/am263x: docs: Update release notes and main page for 9.2
- Update new feature and bug list
- Add release notes page for AM263x
- Update block diagrams

Fixes: PINDSW-7942

Signed-off-by: Dhaval Khandla <dhavaljk@ti.com>
</commit_message>
<xml_diff>
--- a/docs_src/docs/api_guide/images/images.pptx
+++ b/docs_src/docs/api_guide/images/images.pptx
@@ -2706,7 +2706,7 @@
                   <a:schemeClr val="tx1"/>
                 </a:solidFill>
               </a:rPr>
-              <a:t>| Component Mapping for AM243x/AM263x</a:t>
+              <a:t>| Component Mapping for AM243x</a:t>
             </a:r>
           </a:p>
         </p:txBody>
@@ -4202,10 +4202,10 @@
         </p:nvGrpSpPr>
         <p:grpSpPr>
           <a:xfrm>
-            <a:off x="1916007" y="4183801"/>
-            <a:ext cx="6833138" cy="480415"/>
-            <a:chOff x="1759067" y="4578409"/>
-            <a:chExt cx="6833138" cy="480415"/>
+            <a:off x="1630496" y="4171718"/>
+            <a:ext cx="7041048" cy="492498"/>
+            <a:chOff x="1759067" y="4566326"/>
+            <a:chExt cx="6758649" cy="492498"/>
           </a:xfrm>
         </p:grpSpPr>
         <p:sp>
@@ -4295,7 +4295,7 @@
           </p:nvSpPr>
           <p:spPr>
             <a:xfrm>
-              <a:off x="7639027" y="4578409"/>
+              <a:off x="7564538" y="4566326"/>
               <a:ext cx="953178" cy="467021"/>
             </a:xfrm>
             <a:prstGeom prst="rect">
@@ -4368,8 +4368,8 @@
           </p:nvSpPr>
           <p:spPr>
             <a:xfrm>
-              <a:off x="6505903" y="4598961"/>
-              <a:ext cx="958527" cy="446469"/>
+              <a:off x="6454849" y="4566326"/>
+              <a:ext cx="958527" cy="466715"/>
             </a:xfrm>
             <a:prstGeom prst="rect">
               <a:avLst/>
@@ -4588,10 +4588,10 @@
         </p:nvGrpSpPr>
         <p:grpSpPr>
           <a:xfrm>
-            <a:off x="1916007" y="3615216"/>
-            <a:ext cx="7956366" cy="455152"/>
+            <a:off x="1593577" y="3614306"/>
+            <a:ext cx="8187853" cy="472312"/>
             <a:chOff x="1758019" y="3813520"/>
-            <a:chExt cx="7956366" cy="455152"/>
+            <a:chExt cx="7904213" cy="472312"/>
           </a:xfrm>
         </p:grpSpPr>
         <p:sp>
@@ -4608,7 +4608,7 @@
           </p:nvSpPr>
           <p:spPr>
             <a:xfrm>
-              <a:off x="8761207" y="3819186"/>
+              <a:off x="8709054" y="3819287"/>
               <a:ext cx="953178" cy="443974"/>
             </a:xfrm>
             <a:prstGeom prst="rect">
@@ -4681,9 +4681,9 @@
           <p:grpSpPr>
             <a:xfrm>
               <a:off x="1758019" y="3813520"/>
-              <a:ext cx="6836596" cy="455152"/>
+              <a:ext cx="5959354" cy="472312"/>
               <a:chOff x="1759065" y="4007382"/>
-              <a:chExt cx="6836596" cy="455152"/>
+              <a:chExt cx="5959354" cy="472312"/>
             </a:xfrm>
           </p:grpSpPr>
           <p:sp>
@@ -4773,8 +4773,8 @@
             </p:nvSpPr>
             <p:spPr>
               <a:xfrm>
-                <a:off x="7642483" y="4007382"/>
-                <a:ext cx="953178" cy="449640"/>
+                <a:off x="6960689" y="4007382"/>
+                <a:ext cx="757730" cy="449640"/>
               </a:xfrm>
               <a:prstGeom prst="rect">
                 <a:avLst/>
@@ -4840,8 +4840,8 @@
             </p:nvSpPr>
             <p:spPr>
               <a:xfrm>
-                <a:off x="6505901" y="4007382"/>
-                <a:ext cx="958527" cy="449641"/>
+                <a:off x="5971362" y="4007382"/>
+                <a:ext cx="873934" cy="449641"/>
               </a:xfrm>
               <a:prstGeom prst="rect">
                 <a:avLst/>
@@ -4907,8 +4907,8 @@
             </p:nvSpPr>
             <p:spPr>
               <a:xfrm>
-                <a:off x="5400652" y="4007382"/>
-                <a:ext cx="971585" cy="449640"/>
+                <a:off x="4891065" y="4007382"/>
+                <a:ext cx="971585" cy="472312"/>
               </a:xfrm>
               <a:prstGeom prst="rect">
                 <a:avLst/>
@@ -4974,8 +4974,8 @@
             </p:nvSpPr>
             <p:spPr>
               <a:xfrm>
-                <a:off x="4165730" y="4007382"/>
-                <a:ext cx="1069926" cy="449640"/>
+                <a:off x="3740734" y="4007382"/>
+                <a:ext cx="1069926" cy="457573"/>
               </a:xfrm>
               <a:prstGeom prst="rect">
                 <a:avLst/>
@@ -5041,8 +5041,8 @@
             </p:nvSpPr>
             <p:spPr>
               <a:xfrm>
-                <a:off x="2941140" y="4012894"/>
-                <a:ext cx="1049652" cy="449640"/>
+                <a:off x="2864055" y="4010342"/>
+                <a:ext cx="765753" cy="449640"/>
               </a:xfrm>
               <a:prstGeom prst="rect">
                 <a:avLst/>
@@ -5089,7 +5089,19 @@
                     </a:solidFill>
                     <a:latin typeface="Arial"/>
                   </a:rPr>
-                  <a:t>ICSS EMAC</a:t>
+                  <a:t>ICSS </a:t>
+                </a:r>
+              </a:p>
+              <a:p>
+                <a:pPr algn="ctr"/>
+                <a:r>
+                  <a:rPr lang="en-IN" sz="1280" spc="-2" dirty="0">
+                    <a:solidFill>
+                      <a:srgbClr val="000000"/>
+                    </a:solidFill>
+                    <a:latin typeface="Arial"/>
+                  </a:rPr>
+                  <a:t>EMAC</a:t>
                 </a:r>
               </a:p>
             </p:txBody>
@@ -5616,9 +5628,9 @@
         <p:grpSpPr>
           <a:xfrm>
             <a:off x="1781474" y="856156"/>
-            <a:ext cx="6971129" cy="473362"/>
+            <a:ext cx="7876405" cy="473362"/>
             <a:chOff x="1782201" y="1099400"/>
-            <a:chExt cx="6971129" cy="473362"/>
+            <a:chExt cx="7876405" cy="473362"/>
           </a:xfrm>
         </p:grpSpPr>
         <p:sp>
@@ -6074,7 +6086,7 @@
           </p:nvSpPr>
           <p:spPr>
             <a:xfrm>
-              <a:off x="7968408" y="1123122"/>
+              <a:off x="8873684" y="1112808"/>
               <a:ext cx="784922" cy="449640"/>
             </a:xfrm>
             <a:prstGeom prst="rect">
@@ -6718,7 +6730,7 @@
         </p:nvSpPr>
         <p:spPr>
           <a:xfrm>
-            <a:off x="8930950" y="1193400"/>
+            <a:off x="8872957" y="1484364"/>
             <a:ext cx="784922" cy="471109"/>
           </a:xfrm>
           <a:prstGeom prst="rect">
@@ -6787,12 +6799,333 @@
           </a:p>
         </p:txBody>
       </p:sp>
+      <p:sp>
+        <p:nvSpPr>
+          <p:cNvPr id="82" name="CustomShape 15">
+            <a:extLst>
+              <a:ext uri="{FF2B5EF4-FFF2-40B4-BE49-F238E27FC236}">
+                <a16:creationId xmlns:a16="http://schemas.microsoft.com/office/drawing/2014/main" id="{A66BEF25-718C-42F8-B4AD-47D4B69E58E4}"/>
+              </a:ext>
+            </a:extLst>
+          </p:cNvPr>
+          <p:cNvSpPr/>
+          <p:nvPr/>
+        </p:nvSpPr>
+        <p:spPr>
+          <a:xfrm>
+            <a:off x="5397091" y="4200006"/>
+            <a:ext cx="987669" cy="449640"/>
+          </a:xfrm>
+          <a:prstGeom prst="rect">
+            <a:avLst/>
+          </a:prstGeom>
+          <a:solidFill>
+            <a:srgbClr val="00B0F0"/>
+          </a:solidFill>
+          <a:ln>
+            <a:noFill/>
+          </a:ln>
+          <a:effectLst>
+            <a:outerShdw blurRad="50760" dist="37674" dir="2700000" algn="tl" rotWithShape="0">
+              <a:srgbClr val="000000">
+                <a:alpha val="40000"/>
+              </a:srgbClr>
+            </a:outerShdw>
+          </a:effectLst>
+        </p:spPr>
+        <p:style>
+          <a:lnRef idx="2">
+            <a:schemeClr val="accent1">
+              <a:shade val="50000"/>
+            </a:schemeClr>
+          </a:lnRef>
+          <a:fillRef idx="1">
+            <a:schemeClr val="accent1"/>
+          </a:fillRef>
+          <a:effectRef idx="0">
+            <a:schemeClr val="accent1"/>
+          </a:effectRef>
+          <a:fontRef idx="minor"/>
+        </p:style>
+        <p:txBody>
+          <a:bodyPr wrap="none" lIns="90000" tIns="45000" rIns="90000" bIns="45000" anchor="ctr">
+            <a:noAutofit/>
+          </a:bodyPr>
+          <a:lstStyle/>
+          <a:p>
+            <a:pPr algn="ctr"/>
+            <a:r>
+              <a:rPr lang="en-US" sz="1280" spc="-2" dirty="0">
+                <a:solidFill>
+                  <a:srgbClr val="000000"/>
+                </a:solidFill>
+              </a:rPr>
+              <a:t>PRUICSS </a:t>
+            </a:r>
+          </a:p>
+          <a:p>
+            <a:pPr algn="ctr"/>
+            <a:r>
+              <a:rPr lang="en-US" sz="1280" spc="-2" dirty="0">
+                <a:solidFill>
+                  <a:srgbClr val="000000"/>
+                </a:solidFill>
+              </a:rPr>
+              <a:t>PWM</a:t>
+            </a:r>
+            <a:endParaRPr lang="en-IN" sz="1280" spc="-2" dirty="0">
+              <a:solidFill>
+                <a:srgbClr val="000000"/>
+              </a:solidFill>
+              <a:latin typeface="Arial"/>
+            </a:endParaRPr>
+          </a:p>
+        </p:txBody>
+      </p:sp>
+      <p:sp>
+        <p:nvSpPr>
+          <p:cNvPr id="95" name="CustomShape 15">
+            <a:extLst>
+              <a:ext uri="{FF2B5EF4-FFF2-40B4-BE49-F238E27FC236}">
+                <a16:creationId xmlns:a16="http://schemas.microsoft.com/office/drawing/2014/main" id="{A187BFD9-EF2A-48E9-8359-90165FE849BF}"/>
+              </a:ext>
+            </a:extLst>
+          </p:cNvPr>
+          <p:cNvSpPr/>
+          <p:nvPr/>
+        </p:nvSpPr>
+        <p:spPr>
+          <a:xfrm>
+            <a:off x="8791196" y="4161392"/>
+            <a:ext cx="987382" cy="443974"/>
+          </a:xfrm>
+          <a:prstGeom prst="rect">
+            <a:avLst/>
+          </a:prstGeom>
+          <a:solidFill>
+            <a:srgbClr val="00B0F0"/>
+          </a:solidFill>
+          <a:ln>
+            <a:noFill/>
+          </a:ln>
+          <a:effectLst>
+            <a:outerShdw blurRad="50760" dist="37674" dir="2700000" algn="tl" rotWithShape="0">
+              <a:srgbClr val="000000">
+                <a:alpha val="40000"/>
+              </a:srgbClr>
+            </a:outerShdw>
+          </a:effectLst>
+        </p:spPr>
+        <p:style>
+          <a:lnRef idx="2">
+            <a:schemeClr val="accent1">
+              <a:shade val="50000"/>
+            </a:schemeClr>
+          </a:lnRef>
+          <a:fillRef idx="1">
+            <a:schemeClr val="accent1"/>
+          </a:fillRef>
+          <a:effectRef idx="0">
+            <a:schemeClr val="accent1"/>
+          </a:effectRef>
+          <a:fontRef idx="minor"/>
+        </p:style>
+        <p:txBody>
+          <a:bodyPr lIns="90000" tIns="45000" rIns="90000" bIns="45000" anchor="ctr">
+            <a:noAutofit/>
+          </a:bodyPr>
+          <a:lstStyle/>
+          <a:p>
+            <a:pPr algn="ctr"/>
+            <a:r>
+              <a:rPr lang="en-US" sz="1280" spc="-2" dirty="0">
+                <a:solidFill>
+                  <a:srgbClr val="000000"/>
+                </a:solidFill>
+              </a:rPr>
+              <a:t>BiSS-C</a:t>
+            </a:r>
+            <a:endParaRPr lang="en-IN" sz="1280" spc="-2" dirty="0">
+              <a:solidFill>
+                <a:srgbClr val="000000"/>
+              </a:solidFill>
+              <a:latin typeface="Arial"/>
+            </a:endParaRPr>
+          </a:p>
+        </p:txBody>
+      </p:sp>
+      <p:sp>
+        <p:nvSpPr>
+          <p:cNvPr id="100" name="CustomShape 15">
+            <a:extLst>
+              <a:ext uri="{FF2B5EF4-FFF2-40B4-BE49-F238E27FC236}">
+                <a16:creationId xmlns:a16="http://schemas.microsoft.com/office/drawing/2014/main" id="{E158EF4E-99E5-4BAE-9F0A-48570C790A4B}"/>
+              </a:ext>
+            </a:extLst>
+          </p:cNvPr>
+          <p:cNvSpPr/>
+          <p:nvPr/>
+        </p:nvSpPr>
+        <p:spPr>
+          <a:xfrm>
+            <a:off x="7978072" y="875978"/>
+            <a:ext cx="784921" cy="449640"/>
+          </a:xfrm>
+          <a:prstGeom prst="rect">
+            <a:avLst/>
+          </a:prstGeom>
+          <a:solidFill>
+            <a:srgbClr val="00B0F0"/>
+          </a:solidFill>
+          <a:ln>
+            <a:noFill/>
+          </a:ln>
+          <a:effectLst>
+            <a:outerShdw blurRad="50760" dist="37674" dir="2700000" algn="tl" rotWithShape="0">
+              <a:srgbClr val="000000">
+                <a:alpha val="40000"/>
+              </a:srgbClr>
+            </a:outerShdw>
+          </a:effectLst>
+        </p:spPr>
+        <p:style>
+          <a:lnRef idx="2">
+            <a:schemeClr val="accent1">
+              <a:shade val="50000"/>
+            </a:schemeClr>
+          </a:lnRef>
+          <a:fillRef idx="1">
+            <a:schemeClr val="accent1"/>
+          </a:fillRef>
+          <a:effectRef idx="0">
+            <a:schemeClr val="accent1"/>
+          </a:effectRef>
+          <a:fontRef idx="minor"/>
+        </p:style>
+        <p:txBody>
+          <a:bodyPr wrap="none" lIns="90000" tIns="45000" rIns="90000" bIns="45000" anchor="ctr">
+            <a:noAutofit/>
+          </a:bodyPr>
+          <a:lstStyle/>
+          <a:p>
+            <a:pPr algn="ctr"/>
+            <a:r>
+              <a:rPr lang="en-US" sz="1280" spc="-2" dirty="0">
+                <a:solidFill>
+                  <a:srgbClr val="000000"/>
+                </a:solidFill>
+              </a:rPr>
+              <a:t>Nikon </a:t>
+            </a:r>
+          </a:p>
+          <a:p>
+            <a:pPr algn="ctr"/>
+            <a:r>
+              <a:rPr lang="en-US" sz="1280" spc="-2" dirty="0">
+                <a:solidFill>
+                  <a:srgbClr val="000000"/>
+                </a:solidFill>
+              </a:rPr>
+              <a:t>A-Format</a:t>
+            </a:r>
+            <a:endParaRPr lang="en-IN" sz="1280" spc="-2" dirty="0">
+              <a:solidFill>
+                <a:srgbClr val="000000"/>
+              </a:solidFill>
+              <a:latin typeface="Arial"/>
+            </a:endParaRPr>
+          </a:p>
+        </p:txBody>
+      </p:sp>
+      <p:sp>
+        <p:nvSpPr>
+          <p:cNvPr id="101" name="CustomShape 15">
+            <a:extLst>
+              <a:ext uri="{FF2B5EF4-FFF2-40B4-BE49-F238E27FC236}">
+                <a16:creationId xmlns:a16="http://schemas.microsoft.com/office/drawing/2014/main" id="{B0DC690B-AD5B-46F1-BD85-F5E786C440FA}"/>
+              </a:ext>
+            </a:extLst>
+          </p:cNvPr>
+          <p:cNvSpPr/>
+          <p:nvPr/>
+        </p:nvSpPr>
+        <p:spPr>
+          <a:xfrm>
+            <a:off x="7886623" y="3608242"/>
+            <a:ext cx="784921" cy="449640"/>
+          </a:xfrm>
+          <a:prstGeom prst="rect">
+            <a:avLst/>
+          </a:prstGeom>
+          <a:solidFill>
+            <a:srgbClr val="00B0F0"/>
+          </a:solidFill>
+          <a:ln>
+            <a:noFill/>
+          </a:ln>
+          <a:effectLst>
+            <a:outerShdw blurRad="50760" dist="37674" dir="2700000" algn="tl" rotWithShape="0">
+              <a:srgbClr val="000000">
+                <a:alpha val="40000"/>
+              </a:srgbClr>
+            </a:outerShdw>
+          </a:effectLst>
+        </p:spPr>
+        <p:style>
+          <a:lnRef idx="2">
+            <a:schemeClr val="accent1">
+              <a:shade val="50000"/>
+            </a:schemeClr>
+          </a:lnRef>
+          <a:fillRef idx="1">
+            <a:schemeClr val="accent1"/>
+          </a:fillRef>
+          <a:effectRef idx="0">
+            <a:schemeClr val="accent1"/>
+          </a:effectRef>
+          <a:fontRef idx="minor"/>
+        </p:style>
+        <p:txBody>
+          <a:bodyPr wrap="none" lIns="90000" tIns="45000" rIns="90000" bIns="45000" anchor="ctr">
+            <a:noAutofit/>
+          </a:bodyPr>
+          <a:lstStyle/>
+          <a:p>
+            <a:pPr algn="ctr"/>
+            <a:r>
+              <a:rPr lang="en-US" sz="1280" spc="-2" dirty="0">
+                <a:solidFill>
+                  <a:srgbClr val="000000"/>
+                </a:solidFill>
+              </a:rPr>
+              <a:t>Nikon </a:t>
+            </a:r>
+          </a:p>
+          <a:p>
+            <a:pPr algn="ctr"/>
+            <a:r>
+              <a:rPr lang="en-US" sz="1280" spc="-2" dirty="0">
+                <a:solidFill>
+                  <a:srgbClr val="000000"/>
+                </a:solidFill>
+              </a:rPr>
+              <a:t>A-Format</a:t>
+            </a:r>
+            <a:endParaRPr lang="en-IN" sz="1280" spc="-2" dirty="0">
+              <a:solidFill>
+                <a:srgbClr val="000000"/>
+              </a:solidFill>
+              <a:latin typeface="Arial"/>
+            </a:endParaRPr>
+          </a:p>
+        </p:txBody>
+      </p:sp>
       <p:grpSp>
         <p:nvGrpSpPr>
-          <p:cNvPr id="6" name="Group 5">
+          <p:cNvPr id="8" name="Group 7">
             <a:extLst>
               <a:ext uri="{FF2B5EF4-FFF2-40B4-BE49-F238E27FC236}">
-                <a16:creationId xmlns:a16="http://schemas.microsoft.com/office/drawing/2014/main" id="{6E5B55A8-54EE-42C7-A85C-ACE2A970BBE7}"/>
+                <a16:creationId xmlns:a16="http://schemas.microsoft.com/office/drawing/2014/main" id="{BD31DDA8-6026-46C3-898E-6B3CDD0BAD65}"/>
               </a:ext>
             </a:extLst>
           </p:cNvPr>
@@ -6801,18 +7134,727 @@
         </p:nvGrpSpPr>
         <p:grpSpPr>
           <a:xfrm>
-            <a:off x="10156092" y="1104698"/>
-            <a:ext cx="1150179" cy="4769631"/>
-            <a:chOff x="10031151" y="1315640"/>
-            <a:chExt cx="1150179" cy="4769631"/>
+            <a:off x="10156092" y="1042427"/>
+            <a:ext cx="1148754" cy="5041302"/>
+            <a:chOff x="10156092" y="1042427"/>
+            <a:chExt cx="1148754" cy="5041302"/>
           </a:xfrm>
         </p:grpSpPr>
+        <p:grpSp>
+          <p:nvGrpSpPr>
+            <p:cNvPr id="6" name="Group 5">
+              <a:extLst>
+                <a:ext uri="{FF2B5EF4-FFF2-40B4-BE49-F238E27FC236}">
+                  <a16:creationId xmlns:a16="http://schemas.microsoft.com/office/drawing/2014/main" id="{6E5B55A8-54EE-42C7-A85C-ACE2A970BBE7}"/>
+                </a:ext>
+              </a:extLst>
+            </p:cNvPr>
+            <p:cNvGrpSpPr/>
+            <p:nvPr/>
+          </p:nvGrpSpPr>
+          <p:grpSpPr>
+            <a:xfrm>
+              <a:off x="10156092" y="1042427"/>
+              <a:ext cx="1148754" cy="5041302"/>
+              <a:chOff x="10031151" y="1253369"/>
+              <a:chExt cx="1148754" cy="5041302"/>
+            </a:xfrm>
+          </p:grpSpPr>
+          <p:sp>
+            <p:nvSpPr>
+              <p:cNvPr id="54" name="CustomShape 8">
+                <a:extLst>
+                  <a:ext uri="{FF2B5EF4-FFF2-40B4-BE49-F238E27FC236}">
+                    <a16:creationId xmlns:a16="http://schemas.microsoft.com/office/drawing/2014/main" id="{12F95B4D-3759-4104-8D58-EAF6518E9F95}"/>
+                  </a:ext>
+                </a:extLst>
+              </p:cNvPr>
+              <p:cNvSpPr/>
+              <p:nvPr/>
+            </p:nvSpPr>
+            <p:spPr>
+              <a:xfrm>
+                <a:off x="10065487" y="1701064"/>
+                <a:ext cx="1114418" cy="370347"/>
+              </a:xfrm>
+              <a:prstGeom prst="rect">
+                <a:avLst/>
+              </a:prstGeom>
+              <a:solidFill>
+                <a:srgbClr val="00B0F0"/>
+              </a:solidFill>
+              <a:ln>
+                <a:noFill/>
+              </a:ln>
+              <a:effectLst>
+                <a:outerShdw blurRad="50760" dist="37674" dir="2700000" algn="tl" rotWithShape="0">
+                  <a:srgbClr val="000000">
+                    <a:alpha val="40000"/>
+                  </a:srgbClr>
+                </a:outerShdw>
+              </a:effectLst>
+            </p:spPr>
+            <p:style>
+              <a:lnRef idx="2">
+                <a:schemeClr val="accent1">
+                  <a:shade val="50000"/>
+                </a:schemeClr>
+              </a:lnRef>
+              <a:fillRef idx="1">
+                <a:schemeClr val="accent1"/>
+              </a:fillRef>
+              <a:effectRef idx="0">
+                <a:schemeClr val="accent1"/>
+              </a:effectRef>
+              <a:fontRef idx="minor"/>
+            </p:style>
+            <p:txBody>
+              <a:bodyPr lIns="90000" tIns="45000" rIns="90000" bIns="45000" anchor="ctr">
+                <a:noAutofit/>
+              </a:bodyPr>
+              <a:lstStyle/>
+              <a:p>
+                <a:pPr algn="ctr"/>
+                <a:r>
+                  <a:rPr lang="en-IN" sz="1280" spc="-2" dirty="0">
+                    <a:solidFill>
+                      <a:srgbClr val="000000"/>
+                    </a:solidFill>
+                    <a:latin typeface="Arial"/>
+                  </a:rPr>
+                  <a:t>EnDat</a:t>
+                </a:r>
+              </a:p>
+            </p:txBody>
+          </p:sp>
+          <p:sp>
+            <p:nvSpPr>
+              <p:cNvPr id="55" name="CustomShape 8">
+                <a:extLst>
+                  <a:ext uri="{FF2B5EF4-FFF2-40B4-BE49-F238E27FC236}">
+                    <a16:creationId xmlns:a16="http://schemas.microsoft.com/office/drawing/2014/main" id="{D3B83D30-7279-4106-8E40-EC7C6D8CAA48}"/>
+                  </a:ext>
+                </a:extLst>
+              </p:cNvPr>
+              <p:cNvSpPr/>
+              <p:nvPr/>
+            </p:nvSpPr>
+            <p:spPr>
+              <a:xfrm>
+                <a:off x="10054872" y="3077770"/>
+                <a:ext cx="1114418" cy="370347"/>
+              </a:xfrm>
+              <a:prstGeom prst="rect">
+                <a:avLst/>
+              </a:prstGeom>
+              <a:solidFill>
+                <a:srgbClr val="00B0F0"/>
+              </a:solidFill>
+              <a:ln>
+                <a:noFill/>
+              </a:ln>
+              <a:effectLst>
+                <a:outerShdw blurRad="50760" dist="37674" dir="2700000" algn="tl" rotWithShape="0">
+                  <a:srgbClr val="000000">
+                    <a:alpha val="40000"/>
+                  </a:srgbClr>
+                </a:outerShdw>
+              </a:effectLst>
+            </p:spPr>
+            <p:style>
+              <a:lnRef idx="2">
+                <a:schemeClr val="accent1">
+                  <a:shade val="50000"/>
+                </a:schemeClr>
+              </a:lnRef>
+              <a:fillRef idx="1">
+                <a:schemeClr val="accent1"/>
+              </a:fillRef>
+              <a:effectRef idx="0">
+                <a:schemeClr val="accent1"/>
+              </a:effectRef>
+              <a:fontRef idx="minor"/>
+            </p:style>
+            <p:txBody>
+              <a:bodyPr lIns="90000" tIns="45000" rIns="90000" bIns="45000" anchor="ctr">
+                <a:noAutofit/>
+              </a:bodyPr>
+              <a:lstStyle/>
+              <a:p>
+                <a:pPr algn="ctr"/>
+                <a:r>
+                  <a:rPr lang="en-US" sz="1280" spc="-2" dirty="0">
+                    <a:solidFill>
+                      <a:srgbClr val="000000"/>
+                    </a:solidFill>
+                    <a:latin typeface="Arial"/>
+                  </a:rPr>
+                  <a:t>Tamagawa</a:t>
+                </a:r>
+                <a:endParaRPr lang="en-IN" sz="1280" spc="-2" dirty="0">
+                  <a:solidFill>
+                    <a:srgbClr val="000000"/>
+                  </a:solidFill>
+                  <a:latin typeface="Arial"/>
+                </a:endParaRPr>
+              </a:p>
+            </p:txBody>
+          </p:sp>
+          <p:sp>
+            <p:nvSpPr>
+              <p:cNvPr id="57" name="CustomShape 8">
+                <a:extLst>
+                  <a:ext uri="{FF2B5EF4-FFF2-40B4-BE49-F238E27FC236}">
+                    <a16:creationId xmlns:a16="http://schemas.microsoft.com/office/drawing/2014/main" id="{88B97E17-05DC-49D0-B861-F3FA96A2799E}"/>
+                  </a:ext>
+                </a:extLst>
+              </p:cNvPr>
+              <p:cNvSpPr/>
+              <p:nvPr/>
+            </p:nvSpPr>
+            <p:spPr>
+              <a:xfrm>
+                <a:off x="10031151" y="3556829"/>
+                <a:ext cx="1114418" cy="370347"/>
+              </a:xfrm>
+              <a:prstGeom prst="rect">
+                <a:avLst/>
+              </a:prstGeom>
+              <a:solidFill>
+                <a:srgbClr val="00B0F0"/>
+              </a:solidFill>
+              <a:ln>
+                <a:noFill/>
+              </a:ln>
+              <a:effectLst>
+                <a:outerShdw blurRad="50760" dist="37674" dir="2700000" algn="tl" rotWithShape="0">
+                  <a:srgbClr val="000000">
+                    <a:alpha val="40000"/>
+                  </a:srgbClr>
+                </a:outerShdw>
+              </a:effectLst>
+            </p:spPr>
+            <p:style>
+              <a:lnRef idx="2">
+                <a:schemeClr val="accent1">
+                  <a:shade val="50000"/>
+                </a:schemeClr>
+              </a:lnRef>
+              <a:fillRef idx="1">
+                <a:schemeClr val="accent1"/>
+              </a:fillRef>
+              <a:effectRef idx="0">
+                <a:schemeClr val="accent1"/>
+              </a:effectRef>
+              <a:fontRef idx="minor"/>
+            </p:style>
+            <p:txBody>
+              <a:bodyPr lIns="90000" tIns="45000" rIns="90000" bIns="45000" anchor="ctr">
+                <a:noAutofit/>
+              </a:bodyPr>
+              <a:lstStyle/>
+              <a:p>
+                <a:pPr algn="ctr"/>
+                <a:r>
+                  <a:rPr lang="en-IN" sz="1280" spc="-2" dirty="0">
+                    <a:solidFill>
+                      <a:srgbClr val="000000"/>
+                    </a:solidFill>
+                    <a:latin typeface="Arial"/>
+                  </a:rPr>
+                  <a:t>SDFM</a:t>
+                </a:r>
+              </a:p>
+            </p:txBody>
+          </p:sp>
+          <p:sp>
+            <p:nvSpPr>
+              <p:cNvPr id="63" name="CustomShape 8">
+                <a:extLst>
+                  <a:ext uri="{FF2B5EF4-FFF2-40B4-BE49-F238E27FC236}">
+                    <a16:creationId xmlns:a16="http://schemas.microsoft.com/office/drawing/2014/main" id="{7606A0F4-DCD2-4066-9BF4-874B6FC1A482}"/>
+                  </a:ext>
+                </a:extLst>
+              </p:cNvPr>
+              <p:cNvSpPr/>
+              <p:nvPr/>
+            </p:nvSpPr>
+            <p:spPr>
+              <a:xfrm>
+                <a:off x="10054872" y="2151772"/>
+                <a:ext cx="1114418" cy="370347"/>
+              </a:xfrm>
+              <a:prstGeom prst="rect">
+                <a:avLst/>
+              </a:prstGeom>
+              <a:solidFill>
+                <a:srgbClr val="00B0F0"/>
+              </a:solidFill>
+              <a:ln>
+                <a:noFill/>
+              </a:ln>
+              <a:effectLst>
+                <a:outerShdw blurRad="50760" dist="37674" dir="2700000" algn="tl" rotWithShape="0">
+                  <a:srgbClr val="000000">
+                    <a:alpha val="40000"/>
+                  </a:srgbClr>
+                </a:outerShdw>
+              </a:effectLst>
+            </p:spPr>
+            <p:style>
+              <a:lnRef idx="2">
+                <a:schemeClr val="accent1">
+                  <a:shade val="50000"/>
+                </a:schemeClr>
+              </a:lnRef>
+              <a:fillRef idx="1">
+                <a:schemeClr val="accent1"/>
+              </a:fillRef>
+              <a:effectRef idx="0">
+                <a:schemeClr val="accent1"/>
+              </a:effectRef>
+              <a:fontRef idx="minor"/>
+            </p:style>
+            <p:txBody>
+              <a:bodyPr lIns="90000" tIns="45000" rIns="90000" bIns="45000" anchor="ctr">
+                <a:noAutofit/>
+              </a:bodyPr>
+              <a:lstStyle/>
+              <a:p>
+                <a:pPr algn="ctr"/>
+                <a:r>
+                  <a:rPr lang="en-IN" sz="1280" spc="-2" dirty="0">
+                    <a:solidFill>
+                      <a:srgbClr val="000000"/>
+                    </a:solidFill>
+                    <a:latin typeface="Arial"/>
+                  </a:rPr>
+                  <a:t>HDSL</a:t>
+                </a:r>
+              </a:p>
+            </p:txBody>
+          </p:sp>
+          <p:sp>
+            <p:nvSpPr>
+              <p:cNvPr id="43" name="CustomShape 8">
+                <a:extLst>
+                  <a:ext uri="{FF2B5EF4-FFF2-40B4-BE49-F238E27FC236}">
+                    <a16:creationId xmlns:a16="http://schemas.microsoft.com/office/drawing/2014/main" id="{B9B9C38B-2189-4BCB-BA18-0A4C8D7E9AC8}"/>
+                  </a:ext>
+                </a:extLst>
+              </p:cNvPr>
+              <p:cNvSpPr/>
+              <p:nvPr/>
+            </p:nvSpPr>
+            <p:spPr>
+              <a:xfrm>
+                <a:off x="10048745" y="4020464"/>
+                <a:ext cx="1114418" cy="370347"/>
+              </a:xfrm>
+              <a:prstGeom prst="rect">
+                <a:avLst/>
+              </a:prstGeom>
+              <a:solidFill>
+                <a:srgbClr val="92D050"/>
+              </a:solidFill>
+              <a:ln>
+                <a:noFill/>
+              </a:ln>
+              <a:effectLst>
+                <a:outerShdw blurRad="50760" dist="37674" dir="2700000" algn="tl" rotWithShape="0">
+                  <a:srgbClr val="000000">
+                    <a:alpha val="40000"/>
+                  </a:srgbClr>
+                </a:outerShdw>
+              </a:effectLst>
+            </p:spPr>
+            <p:style>
+              <a:lnRef idx="2">
+                <a:schemeClr val="accent1">
+                  <a:shade val="50000"/>
+                </a:schemeClr>
+              </a:lnRef>
+              <a:fillRef idx="1">
+                <a:schemeClr val="accent1"/>
+              </a:fillRef>
+              <a:effectRef idx="0">
+                <a:schemeClr val="accent1"/>
+              </a:effectRef>
+              <a:fontRef idx="minor"/>
+            </p:style>
+            <p:txBody>
+              <a:bodyPr lIns="56250" tIns="28125" rIns="56250" bIns="28125" anchor="ctr">
+                <a:noAutofit/>
+              </a:bodyPr>
+              <a:lstStyle/>
+              <a:p>
+                <a:pPr algn="ctr"/>
+                <a:r>
+                  <a:rPr lang="en-US" sz="1280" spc="-1" dirty="0">
+                    <a:solidFill>
+                      <a:srgbClr val="000000"/>
+                    </a:solidFill>
+                    <a:latin typeface="Arial"/>
+                  </a:rPr>
+                  <a:t>EtherNet/IP</a:t>
+                </a:r>
+                <a:endParaRPr lang="en-IN" sz="1280" spc="-1" dirty="0">
+                  <a:solidFill>
+                    <a:srgbClr val="000000"/>
+                  </a:solidFill>
+                  <a:latin typeface="Arial"/>
+                </a:endParaRPr>
+              </a:p>
+            </p:txBody>
+          </p:sp>
+          <p:sp>
+            <p:nvSpPr>
+              <p:cNvPr id="44" name="CustomShape 8">
+                <a:extLst>
+                  <a:ext uri="{FF2B5EF4-FFF2-40B4-BE49-F238E27FC236}">
+                    <a16:creationId xmlns:a16="http://schemas.microsoft.com/office/drawing/2014/main" id="{64360DD5-025B-4378-8504-C84B4FA5AF28}"/>
+                  </a:ext>
+                </a:extLst>
+              </p:cNvPr>
+              <p:cNvSpPr/>
+              <p:nvPr/>
+            </p:nvSpPr>
+            <p:spPr>
+              <a:xfrm>
+                <a:off x="10061000" y="4477967"/>
+                <a:ext cx="1102163" cy="370347"/>
+              </a:xfrm>
+              <a:prstGeom prst="rect">
+                <a:avLst/>
+              </a:prstGeom>
+              <a:solidFill>
+                <a:srgbClr val="92D050"/>
+              </a:solidFill>
+              <a:ln>
+                <a:noFill/>
+              </a:ln>
+              <a:effectLst>
+                <a:outerShdw blurRad="50760" dist="37674" dir="2700000" algn="tl" rotWithShape="0">
+                  <a:srgbClr val="000000">
+                    <a:alpha val="40000"/>
+                  </a:srgbClr>
+                </a:outerShdw>
+              </a:effectLst>
+            </p:spPr>
+            <p:style>
+              <a:lnRef idx="2">
+                <a:schemeClr val="accent1">
+                  <a:shade val="50000"/>
+                </a:schemeClr>
+              </a:lnRef>
+              <a:fillRef idx="1">
+                <a:schemeClr val="accent1"/>
+              </a:fillRef>
+              <a:effectRef idx="0">
+                <a:schemeClr val="accent1"/>
+              </a:effectRef>
+              <a:fontRef idx="minor"/>
+            </p:style>
+            <p:txBody>
+              <a:bodyPr lIns="56250" tIns="28125" rIns="56250" bIns="28125" anchor="ctr">
+                <a:noAutofit/>
+              </a:bodyPr>
+              <a:lstStyle/>
+              <a:p>
+                <a:pPr algn="ctr"/>
+                <a:r>
+                  <a:rPr lang="en-US" sz="1280" spc="-1" dirty="0">
+                    <a:solidFill>
+                      <a:srgbClr val="000000"/>
+                    </a:solidFill>
+                    <a:latin typeface="Arial"/>
+                  </a:rPr>
+                  <a:t>EtherCAT</a:t>
+                </a:r>
+                <a:endParaRPr lang="en-IN" sz="1280" spc="-1" dirty="0">
+                  <a:solidFill>
+                    <a:srgbClr val="000000"/>
+                  </a:solidFill>
+                  <a:latin typeface="Arial"/>
+                </a:endParaRPr>
+              </a:p>
+            </p:txBody>
+          </p:sp>
+          <p:sp>
+            <p:nvSpPr>
+              <p:cNvPr id="45" name="CustomShape 8">
+                <a:extLst>
+                  <a:ext uri="{FF2B5EF4-FFF2-40B4-BE49-F238E27FC236}">
+                    <a16:creationId xmlns:a16="http://schemas.microsoft.com/office/drawing/2014/main" id="{32A75533-C752-44D1-9C09-E3E3E9A8E712}"/>
+                  </a:ext>
+                </a:extLst>
+              </p:cNvPr>
+              <p:cNvSpPr/>
+              <p:nvPr/>
+            </p:nvSpPr>
+            <p:spPr>
+              <a:xfrm>
+                <a:off x="10064545" y="4935470"/>
+                <a:ext cx="1091855" cy="370347"/>
+              </a:xfrm>
+              <a:prstGeom prst="rect">
+                <a:avLst/>
+              </a:prstGeom>
+              <a:solidFill>
+                <a:srgbClr val="92D050"/>
+              </a:solidFill>
+              <a:ln>
+                <a:noFill/>
+              </a:ln>
+              <a:effectLst>
+                <a:outerShdw blurRad="50760" dist="37674" dir="2700000" algn="tl" rotWithShape="0">
+                  <a:srgbClr val="000000">
+                    <a:alpha val="40000"/>
+                  </a:srgbClr>
+                </a:outerShdw>
+              </a:effectLst>
+            </p:spPr>
+            <p:style>
+              <a:lnRef idx="2">
+                <a:schemeClr val="accent1">
+                  <a:shade val="50000"/>
+                </a:schemeClr>
+              </a:lnRef>
+              <a:fillRef idx="1">
+                <a:schemeClr val="accent1"/>
+              </a:fillRef>
+              <a:effectRef idx="0">
+                <a:schemeClr val="accent1"/>
+              </a:effectRef>
+              <a:fontRef idx="minor"/>
+            </p:style>
+            <p:txBody>
+              <a:bodyPr lIns="56250" tIns="28125" rIns="56250" bIns="28125" anchor="ctr">
+                <a:noAutofit/>
+              </a:bodyPr>
+              <a:lstStyle/>
+              <a:p>
+                <a:pPr algn="ctr"/>
+                <a:r>
+                  <a:rPr lang="en-IN" sz="1280" spc="-1" dirty="0">
+                    <a:solidFill>
+                      <a:srgbClr val="000000"/>
+                    </a:solidFill>
+                    <a:latin typeface="Arial"/>
+                  </a:rPr>
+                  <a:t>Profinet</a:t>
+                </a:r>
+              </a:p>
+            </p:txBody>
+          </p:sp>
+          <p:sp>
+            <p:nvSpPr>
+              <p:cNvPr id="46" name="CustomShape 8">
+                <a:extLst>
+                  <a:ext uri="{FF2B5EF4-FFF2-40B4-BE49-F238E27FC236}">
+                    <a16:creationId xmlns:a16="http://schemas.microsoft.com/office/drawing/2014/main" id="{F14C8740-1E3F-43F2-A90F-7AED10928173}"/>
+                  </a:ext>
+                </a:extLst>
+              </p:cNvPr>
+              <p:cNvSpPr/>
+              <p:nvPr/>
+            </p:nvSpPr>
+            <p:spPr>
+              <a:xfrm>
+                <a:off x="10042819" y="5441107"/>
+                <a:ext cx="1102162" cy="370347"/>
+              </a:xfrm>
+              <a:prstGeom prst="rect">
+                <a:avLst/>
+              </a:prstGeom>
+              <a:solidFill>
+                <a:srgbClr val="92D050"/>
+              </a:solidFill>
+              <a:ln>
+                <a:noFill/>
+              </a:ln>
+              <a:effectLst>
+                <a:outerShdw blurRad="50760" dist="37674" dir="2700000" algn="tl" rotWithShape="0">
+                  <a:srgbClr val="000000">
+                    <a:alpha val="40000"/>
+                  </a:srgbClr>
+                </a:outerShdw>
+              </a:effectLst>
+            </p:spPr>
+            <p:style>
+              <a:lnRef idx="2">
+                <a:schemeClr val="accent1">
+                  <a:shade val="50000"/>
+                </a:schemeClr>
+              </a:lnRef>
+              <a:fillRef idx="1">
+                <a:schemeClr val="accent1"/>
+              </a:fillRef>
+              <a:effectRef idx="0">
+                <a:schemeClr val="accent1"/>
+              </a:effectRef>
+              <a:fontRef idx="minor"/>
+            </p:style>
+            <p:txBody>
+              <a:bodyPr lIns="56250" tIns="28125" rIns="56250" bIns="28125" anchor="ctr">
+                <a:noAutofit/>
+              </a:bodyPr>
+              <a:lstStyle/>
+              <a:p>
+                <a:pPr algn="ctr"/>
+                <a:r>
+                  <a:rPr lang="en-IN" sz="1280" spc="-1" dirty="0">
+                    <a:solidFill>
+                      <a:srgbClr val="000000"/>
+                    </a:solidFill>
+                    <a:latin typeface="Arial"/>
+                  </a:rPr>
+                  <a:t>HSR/PRP</a:t>
+                </a:r>
+              </a:p>
+            </p:txBody>
+          </p:sp>
+          <p:sp>
+            <p:nvSpPr>
+              <p:cNvPr id="48" name="CustomShape 8">
+                <a:extLst>
+                  <a:ext uri="{FF2B5EF4-FFF2-40B4-BE49-F238E27FC236}">
+                    <a16:creationId xmlns:a16="http://schemas.microsoft.com/office/drawing/2014/main" id="{5A281F1F-1FED-41D1-9B89-8CD6235CB383}"/>
+                  </a:ext>
+                </a:extLst>
+              </p:cNvPr>
+              <p:cNvSpPr/>
+              <p:nvPr/>
+            </p:nvSpPr>
+            <p:spPr>
+              <a:xfrm>
+                <a:off x="10031151" y="5924324"/>
+                <a:ext cx="1102161" cy="370347"/>
+              </a:xfrm>
+              <a:prstGeom prst="rect">
+                <a:avLst/>
+              </a:prstGeom>
+              <a:solidFill>
+                <a:srgbClr val="92D050"/>
+              </a:solidFill>
+              <a:ln>
+                <a:noFill/>
+              </a:ln>
+              <a:effectLst>
+                <a:outerShdw blurRad="50760" dist="37674" dir="2700000" algn="tl" rotWithShape="0">
+                  <a:srgbClr val="000000">
+                    <a:alpha val="40000"/>
+                  </a:srgbClr>
+                </a:outerShdw>
+              </a:effectLst>
+            </p:spPr>
+            <p:style>
+              <a:lnRef idx="2">
+                <a:schemeClr val="accent1">
+                  <a:shade val="50000"/>
+                </a:schemeClr>
+              </a:lnRef>
+              <a:fillRef idx="1">
+                <a:schemeClr val="accent1"/>
+              </a:fillRef>
+              <a:effectRef idx="0">
+                <a:schemeClr val="accent1"/>
+              </a:effectRef>
+              <a:fontRef idx="minor"/>
+            </p:style>
+            <p:txBody>
+              <a:bodyPr lIns="56250" tIns="28125" rIns="56250" bIns="28125" anchor="ctr">
+                <a:noAutofit/>
+              </a:bodyPr>
+              <a:lstStyle/>
+              <a:p>
+                <a:pPr algn="ctr"/>
+                <a:r>
+                  <a:rPr lang="en-IN" sz="1100" spc="-1" dirty="0">
+                    <a:solidFill>
+                      <a:srgbClr val="000000"/>
+                    </a:solidFill>
+                    <a:latin typeface="Arial"/>
+                  </a:rPr>
+                  <a:t>ENET MAC/Switch</a:t>
+                </a:r>
+              </a:p>
+            </p:txBody>
+          </p:sp>
+          <p:sp>
+            <p:nvSpPr>
+              <p:cNvPr id="81" name="CustomShape 8">
+                <a:extLst>
+                  <a:ext uri="{FF2B5EF4-FFF2-40B4-BE49-F238E27FC236}">
+                    <a16:creationId xmlns:a16="http://schemas.microsoft.com/office/drawing/2014/main" id="{DA175DF9-35CC-4E63-BB7D-886445F2B22F}"/>
+                  </a:ext>
+                </a:extLst>
+              </p:cNvPr>
+              <p:cNvSpPr/>
+              <p:nvPr/>
+            </p:nvSpPr>
+            <p:spPr>
+              <a:xfrm>
+                <a:off x="10043786" y="1253369"/>
+                <a:ext cx="1114418" cy="370347"/>
+              </a:xfrm>
+              <a:prstGeom prst="rect">
+                <a:avLst/>
+              </a:prstGeom>
+              <a:solidFill>
+                <a:srgbClr val="00B0F0"/>
+              </a:solidFill>
+              <a:ln>
+                <a:noFill/>
+              </a:ln>
+              <a:effectLst>
+                <a:outerShdw blurRad="50760" dist="37674" dir="2700000" algn="tl" rotWithShape="0">
+                  <a:srgbClr val="000000">
+                    <a:alpha val="40000"/>
+                  </a:srgbClr>
+                </a:outerShdw>
+              </a:effectLst>
+            </p:spPr>
+            <p:style>
+              <a:lnRef idx="2">
+                <a:schemeClr val="accent1">
+                  <a:shade val="50000"/>
+                </a:schemeClr>
+              </a:lnRef>
+              <a:fillRef idx="1">
+                <a:schemeClr val="accent1"/>
+              </a:fillRef>
+              <a:effectRef idx="0">
+                <a:schemeClr val="accent1"/>
+              </a:effectRef>
+              <a:fontRef idx="minor"/>
+            </p:style>
+            <p:txBody>
+              <a:bodyPr lIns="90000" tIns="45000" rIns="90000" bIns="45000" anchor="ctr">
+                <a:noAutofit/>
+              </a:bodyPr>
+              <a:lstStyle/>
+              <a:p>
+                <a:pPr algn="ctr"/>
+                <a:r>
+                  <a:rPr lang="en-IN" sz="1280" spc="-2" dirty="0">
+                    <a:solidFill>
+                      <a:srgbClr val="000000"/>
+                    </a:solidFill>
+                    <a:latin typeface="Arial"/>
+                  </a:rPr>
+                  <a:t>BiSS-C</a:t>
+                </a:r>
+              </a:p>
+            </p:txBody>
+          </p:sp>
+        </p:grpSp>
         <p:sp>
           <p:nvSpPr>
-            <p:cNvPr id="54" name="CustomShape 8">
+            <p:cNvPr id="102" name="CustomShape 8">
               <a:extLst>
                 <a:ext uri="{FF2B5EF4-FFF2-40B4-BE49-F238E27FC236}">
-                  <a16:creationId xmlns:a16="http://schemas.microsoft.com/office/drawing/2014/main" id="{12F95B4D-3759-4104-8D58-EAF6518E9F95}"/>
+                  <a16:creationId xmlns:a16="http://schemas.microsoft.com/office/drawing/2014/main" id="{D3B04458-DB2E-44DE-BD3C-AFF2D17036A5}"/>
                 </a:ext>
               </a:extLst>
             </p:cNvPr>
@@ -6821,7 +7863,7 @@
           </p:nvSpPr>
           <p:spPr>
             <a:xfrm>
-              <a:off x="10041247" y="1315640"/>
+              <a:off x="10168727" y="2395597"/>
               <a:ext cx="1114418" cy="370347"/>
             </a:xfrm>
             <a:prstGeom prst="rect">
@@ -6869,788 +7911,12 @@
                   </a:solidFill>
                   <a:latin typeface="Arial"/>
                 </a:rPr>
-                <a:t>EnDat</a:t>
-              </a:r>
-            </a:p>
-          </p:txBody>
-        </p:sp>
-        <p:sp>
-          <p:nvSpPr>
-            <p:cNvPr id="55" name="CustomShape 8">
-              <a:extLst>
-                <a:ext uri="{FF2B5EF4-FFF2-40B4-BE49-F238E27FC236}">
-                  <a16:creationId xmlns:a16="http://schemas.microsoft.com/office/drawing/2014/main" id="{D3B83D30-7279-4106-8E40-EC7C6D8CAA48}"/>
-                </a:ext>
-              </a:extLst>
-            </p:cNvPr>
-            <p:cNvSpPr/>
-            <p:nvPr/>
-          </p:nvSpPr>
-          <p:spPr>
-            <a:xfrm>
-              <a:off x="10031151" y="1800606"/>
-              <a:ext cx="1114418" cy="370347"/>
-            </a:xfrm>
-            <a:prstGeom prst="rect">
-              <a:avLst/>
-            </a:prstGeom>
-            <a:solidFill>
-              <a:srgbClr val="00B0F0"/>
-            </a:solidFill>
-            <a:ln>
-              <a:noFill/>
-            </a:ln>
-            <a:effectLst>
-              <a:outerShdw blurRad="50760" dist="37674" dir="2700000" algn="tl" rotWithShape="0">
-                <a:srgbClr val="000000">
-                  <a:alpha val="40000"/>
-                </a:srgbClr>
-              </a:outerShdw>
-            </a:effectLst>
-          </p:spPr>
-          <p:style>
-            <a:lnRef idx="2">
-              <a:schemeClr val="accent1">
-                <a:shade val="50000"/>
-              </a:schemeClr>
-            </a:lnRef>
-            <a:fillRef idx="1">
-              <a:schemeClr val="accent1"/>
-            </a:fillRef>
-            <a:effectRef idx="0">
-              <a:schemeClr val="accent1"/>
-            </a:effectRef>
-            <a:fontRef idx="minor"/>
-          </p:style>
-          <p:txBody>
-            <a:bodyPr lIns="90000" tIns="45000" rIns="90000" bIns="45000" anchor="ctr">
-              <a:noAutofit/>
-            </a:bodyPr>
-            <a:lstStyle/>
-            <a:p>
-              <a:pPr algn="ctr"/>
-              <a:r>
-                <a:rPr lang="en-US" sz="1280" spc="-2" dirty="0">
-                  <a:solidFill>
-                    <a:srgbClr val="000000"/>
-                  </a:solidFill>
-                  <a:latin typeface="Arial"/>
-                </a:rPr>
-                <a:t>Tamagawa</a:t>
-              </a:r>
-              <a:endParaRPr lang="en-IN" sz="1280" spc="-2" dirty="0">
-                <a:solidFill>
-                  <a:srgbClr val="000000"/>
-                </a:solidFill>
-                <a:latin typeface="Arial"/>
-              </a:endParaRPr>
-            </a:p>
-          </p:txBody>
-        </p:sp>
-        <p:sp>
-          <p:nvSpPr>
-            <p:cNvPr id="57" name="CustomShape 8">
-              <a:extLst>
-                <a:ext uri="{FF2B5EF4-FFF2-40B4-BE49-F238E27FC236}">
-                  <a16:creationId xmlns:a16="http://schemas.microsoft.com/office/drawing/2014/main" id="{88B97E17-05DC-49D0-B861-F3FA96A2799E}"/>
-                </a:ext>
-              </a:extLst>
-            </p:cNvPr>
-            <p:cNvSpPr/>
-            <p:nvPr/>
-          </p:nvSpPr>
-          <p:spPr>
-            <a:xfrm>
-              <a:off x="10031151" y="3262884"/>
-              <a:ext cx="1114418" cy="370347"/>
-            </a:xfrm>
-            <a:prstGeom prst="rect">
-              <a:avLst/>
-            </a:prstGeom>
-            <a:solidFill>
-              <a:srgbClr val="00B0F0"/>
-            </a:solidFill>
-            <a:ln>
-              <a:noFill/>
-            </a:ln>
-            <a:effectLst>
-              <a:outerShdw blurRad="50760" dist="37674" dir="2700000" algn="tl" rotWithShape="0">
-                <a:srgbClr val="000000">
-                  <a:alpha val="40000"/>
-                </a:srgbClr>
-              </a:outerShdw>
-            </a:effectLst>
-          </p:spPr>
-          <p:style>
-            <a:lnRef idx="2">
-              <a:schemeClr val="accent1">
-                <a:shade val="50000"/>
-              </a:schemeClr>
-            </a:lnRef>
-            <a:fillRef idx="1">
-              <a:schemeClr val="accent1"/>
-            </a:fillRef>
-            <a:effectRef idx="0">
-              <a:schemeClr val="accent1"/>
-            </a:effectRef>
-            <a:fontRef idx="minor"/>
-          </p:style>
-          <p:txBody>
-            <a:bodyPr lIns="90000" tIns="45000" rIns="90000" bIns="45000" anchor="ctr">
-              <a:noAutofit/>
-            </a:bodyPr>
-            <a:lstStyle/>
-            <a:p>
-              <a:pPr algn="ctr"/>
-              <a:r>
-                <a:rPr lang="en-IN" sz="1280" spc="-2" dirty="0">
-                  <a:solidFill>
-                    <a:srgbClr val="000000"/>
-                  </a:solidFill>
-                  <a:latin typeface="Arial"/>
-                </a:rPr>
-                <a:t>SDFM</a:t>
-              </a:r>
-            </a:p>
-          </p:txBody>
-        </p:sp>
-        <p:sp>
-          <p:nvSpPr>
-            <p:cNvPr id="63" name="CustomShape 8">
-              <a:extLst>
-                <a:ext uri="{FF2B5EF4-FFF2-40B4-BE49-F238E27FC236}">
-                  <a16:creationId xmlns:a16="http://schemas.microsoft.com/office/drawing/2014/main" id="{7606A0F4-DCD2-4066-9BF4-874B6FC1A482}"/>
-                </a:ext>
-              </a:extLst>
-            </p:cNvPr>
-            <p:cNvSpPr/>
-            <p:nvPr/>
-          </p:nvSpPr>
-          <p:spPr>
-            <a:xfrm>
-              <a:off x="10031151" y="2285572"/>
-              <a:ext cx="1114418" cy="370347"/>
-            </a:xfrm>
-            <a:prstGeom prst="rect">
-              <a:avLst/>
-            </a:prstGeom>
-            <a:solidFill>
-              <a:srgbClr val="00B0F0"/>
-            </a:solidFill>
-            <a:ln>
-              <a:noFill/>
-            </a:ln>
-            <a:effectLst>
-              <a:outerShdw blurRad="50760" dist="37674" dir="2700000" algn="tl" rotWithShape="0">
-                <a:srgbClr val="000000">
-                  <a:alpha val="40000"/>
-                </a:srgbClr>
-              </a:outerShdw>
-            </a:effectLst>
-          </p:spPr>
-          <p:style>
-            <a:lnRef idx="2">
-              <a:schemeClr val="accent1">
-                <a:shade val="50000"/>
-              </a:schemeClr>
-            </a:lnRef>
-            <a:fillRef idx="1">
-              <a:schemeClr val="accent1"/>
-            </a:fillRef>
-            <a:effectRef idx="0">
-              <a:schemeClr val="accent1"/>
-            </a:effectRef>
-            <a:fontRef idx="minor"/>
-          </p:style>
-          <p:txBody>
-            <a:bodyPr lIns="90000" tIns="45000" rIns="90000" bIns="45000" anchor="ctr">
-              <a:noAutofit/>
-            </a:bodyPr>
-            <a:lstStyle/>
-            <a:p>
-              <a:pPr algn="ctr"/>
-              <a:r>
-                <a:rPr lang="en-IN" sz="1280" spc="-2" dirty="0">
-                  <a:solidFill>
-                    <a:srgbClr val="000000"/>
-                  </a:solidFill>
-                  <a:latin typeface="Arial"/>
-                </a:rPr>
-                <a:t>HDSL</a:t>
-              </a:r>
-            </a:p>
-          </p:txBody>
-        </p:sp>
-        <p:sp>
-          <p:nvSpPr>
-            <p:cNvPr id="43" name="CustomShape 8">
-              <a:extLst>
-                <a:ext uri="{FF2B5EF4-FFF2-40B4-BE49-F238E27FC236}">
-                  <a16:creationId xmlns:a16="http://schemas.microsoft.com/office/drawing/2014/main" id="{B9B9C38B-2189-4BCB-BA18-0A4C8D7E9AC8}"/>
-                </a:ext>
-              </a:extLst>
-            </p:cNvPr>
-            <p:cNvSpPr/>
-            <p:nvPr/>
-          </p:nvSpPr>
-          <p:spPr>
-            <a:xfrm>
-              <a:off x="10041247" y="3744453"/>
-              <a:ext cx="1114418" cy="370347"/>
-            </a:xfrm>
-            <a:prstGeom prst="rect">
-              <a:avLst/>
-            </a:prstGeom>
-            <a:solidFill>
-              <a:srgbClr val="92D050"/>
-            </a:solidFill>
-            <a:ln>
-              <a:noFill/>
-            </a:ln>
-            <a:effectLst>
-              <a:outerShdw blurRad="50760" dist="37674" dir="2700000" algn="tl" rotWithShape="0">
-                <a:srgbClr val="000000">
-                  <a:alpha val="40000"/>
-                </a:srgbClr>
-              </a:outerShdw>
-            </a:effectLst>
-          </p:spPr>
-          <p:style>
-            <a:lnRef idx="2">
-              <a:schemeClr val="accent1">
-                <a:shade val="50000"/>
-              </a:schemeClr>
-            </a:lnRef>
-            <a:fillRef idx="1">
-              <a:schemeClr val="accent1"/>
-            </a:fillRef>
-            <a:effectRef idx="0">
-              <a:schemeClr val="accent1"/>
-            </a:effectRef>
-            <a:fontRef idx="minor"/>
-          </p:style>
-          <p:txBody>
-            <a:bodyPr lIns="56250" tIns="28125" rIns="56250" bIns="28125" anchor="ctr">
-              <a:noAutofit/>
-            </a:bodyPr>
-            <a:lstStyle/>
-            <a:p>
-              <a:pPr algn="ctr"/>
-              <a:r>
-                <a:rPr lang="en-US" sz="1280" spc="-1" dirty="0">
-                  <a:solidFill>
-                    <a:srgbClr val="000000"/>
-                  </a:solidFill>
-                  <a:latin typeface="Arial"/>
-                </a:rPr>
-                <a:t>EtherNet/IP</a:t>
-              </a:r>
-              <a:endParaRPr lang="en-IN" sz="1280" spc="-1" dirty="0">
-                <a:solidFill>
-                  <a:srgbClr val="000000"/>
-                </a:solidFill>
-                <a:latin typeface="Arial"/>
-              </a:endParaRPr>
-            </a:p>
-          </p:txBody>
-        </p:sp>
-        <p:sp>
-          <p:nvSpPr>
-            <p:cNvPr id="44" name="CustomShape 8">
-              <a:extLst>
-                <a:ext uri="{FF2B5EF4-FFF2-40B4-BE49-F238E27FC236}">
-                  <a16:creationId xmlns:a16="http://schemas.microsoft.com/office/drawing/2014/main" id="{64360DD5-025B-4378-8504-C84B4FA5AF28}"/>
-                </a:ext>
-              </a:extLst>
-            </p:cNvPr>
-            <p:cNvSpPr/>
-            <p:nvPr/>
-          </p:nvSpPr>
-          <p:spPr>
-            <a:xfrm>
-              <a:off x="10053484" y="4224257"/>
-              <a:ext cx="1102163" cy="370347"/>
-            </a:xfrm>
-            <a:prstGeom prst="rect">
-              <a:avLst/>
-            </a:prstGeom>
-            <a:solidFill>
-              <a:srgbClr val="92D050"/>
-            </a:solidFill>
-            <a:ln>
-              <a:noFill/>
-            </a:ln>
-            <a:effectLst>
-              <a:outerShdw blurRad="50760" dist="37674" dir="2700000" algn="tl" rotWithShape="0">
-                <a:srgbClr val="000000">
-                  <a:alpha val="40000"/>
-                </a:srgbClr>
-              </a:outerShdw>
-            </a:effectLst>
-          </p:spPr>
-          <p:style>
-            <a:lnRef idx="2">
-              <a:schemeClr val="accent1">
-                <a:shade val="50000"/>
-              </a:schemeClr>
-            </a:lnRef>
-            <a:fillRef idx="1">
-              <a:schemeClr val="accent1"/>
-            </a:fillRef>
-            <a:effectRef idx="0">
-              <a:schemeClr val="accent1"/>
-            </a:effectRef>
-            <a:fontRef idx="minor"/>
-          </p:style>
-          <p:txBody>
-            <a:bodyPr lIns="56250" tIns="28125" rIns="56250" bIns="28125" anchor="ctr">
-              <a:noAutofit/>
-            </a:bodyPr>
-            <a:lstStyle/>
-            <a:p>
-              <a:pPr algn="ctr"/>
-              <a:r>
-                <a:rPr lang="en-US" sz="1280" spc="-1" dirty="0">
-                  <a:solidFill>
-                    <a:srgbClr val="000000"/>
-                  </a:solidFill>
-                  <a:latin typeface="Arial"/>
-                </a:rPr>
-                <a:t>EtherCAT</a:t>
-              </a:r>
-              <a:endParaRPr lang="en-IN" sz="1280" spc="-1" dirty="0">
-                <a:solidFill>
-                  <a:srgbClr val="000000"/>
-                </a:solidFill>
-                <a:latin typeface="Arial"/>
-              </a:endParaRPr>
-            </a:p>
-          </p:txBody>
-        </p:sp>
-        <p:sp>
-          <p:nvSpPr>
-            <p:cNvPr id="45" name="CustomShape 8">
-              <a:extLst>
-                <a:ext uri="{FF2B5EF4-FFF2-40B4-BE49-F238E27FC236}">
-                  <a16:creationId xmlns:a16="http://schemas.microsoft.com/office/drawing/2014/main" id="{32A75533-C752-44D1-9C09-E3E3E9A8E712}"/>
-                </a:ext>
-              </a:extLst>
-            </p:cNvPr>
-            <p:cNvSpPr/>
-            <p:nvPr/>
-          </p:nvSpPr>
-          <p:spPr>
-            <a:xfrm>
-              <a:off x="10079168" y="4715366"/>
-              <a:ext cx="1091855" cy="370347"/>
-            </a:xfrm>
-            <a:prstGeom prst="rect">
-              <a:avLst/>
-            </a:prstGeom>
-            <a:solidFill>
-              <a:srgbClr val="92D050"/>
-            </a:solidFill>
-            <a:ln>
-              <a:noFill/>
-            </a:ln>
-            <a:effectLst>
-              <a:outerShdw blurRad="50760" dist="37674" dir="2700000" algn="tl" rotWithShape="0">
-                <a:srgbClr val="000000">
-                  <a:alpha val="40000"/>
-                </a:srgbClr>
-              </a:outerShdw>
-            </a:effectLst>
-          </p:spPr>
-          <p:style>
-            <a:lnRef idx="2">
-              <a:schemeClr val="accent1">
-                <a:shade val="50000"/>
-              </a:schemeClr>
-            </a:lnRef>
-            <a:fillRef idx="1">
-              <a:schemeClr val="accent1"/>
-            </a:fillRef>
-            <a:effectRef idx="0">
-              <a:schemeClr val="accent1"/>
-            </a:effectRef>
-            <a:fontRef idx="minor"/>
-          </p:style>
-          <p:txBody>
-            <a:bodyPr lIns="56250" tIns="28125" rIns="56250" bIns="28125" anchor="ctr">
-              <a:noAutofit/>
-            </a:bodyPr>
-            <a:lstStyle/>
-            <a:p>
-              <a:pPr algn="ctr"/>
-              <a:r>
-                <a:rPr lang="en-IN" sz="1280" spc="-1" dirty="0">
-                  <a:solidFill>
-                    <a:srgbClr val="000000"/>
-                  </a:solidFill>
-                  <a:latin typeface="Arial"/>
-                </a:rPr>
-                <a:t>Profinet</a:t>
-              </a:r>
-            </a:p>
-          </p:txBody>
-        </p:sp>
-        <p:sp>
-          <p:nvSpPr>
-            <p:cNvPr id="46" name="CustomShape 8">
-              <a:extLst>
-                <a:ext uri="{FF2B5EF4-FFF2-40B4-BE49-F238E27FC236}">
-                  <a16:creationId xmlns:a16="http://schemas.microsoft.com/office/drawing/2014/main" id="{F14C8740-1E3F-43F2-A90F-7AED10928173}"/>
-                </a:ext>
-              </a:extLst>
-            </p:cNvPr>
-            <p:cNvSpPr/>
-            <p:nvPr/>
-          </p:nvSpPr>
-          <p:spPr>
-            <a:xfrm>
-              <a:off x="10079168" y="5212434"/>
-              <a:ext cx="1102162" cy="370347"/>
-            </a:xfrm>
-            <a:prstGeom prst="rect">
-              <a:avLst/>
-            </a:prstGeom>
-            <a:solidFill>
-              <a:srgbClr val="92D050"/>
-            </a:solidFill>
-            <a:ln>
-              <a:noFill/>
-            </a:ln>
-            <a:effectLst>
-              <a:outerShdw blurRad="50760" dist="37674" dir="2700000" algn="tl" rotWithShape="0">
-                <a:srgbClr val="000000">
-                  <a:alpha val="40000"/>
-                </a:srgbClr>
-              </a:outerShdw>
-            </a:effectLst>
-          </p:spPr>
-          <p:style>
-            <a:lnRef idx="2">
-              <a:schemeClr val="accent1">
-                <a:shade val="50000"/>
-              </a:schemeClr>
-            </a:lnRef>
-            <a:fillRef idx="1">
-              <a:schemeClr val="accent1"/>
-            </a:fillRef>
-            <a:effectRef idx="0">
-              <a:schemeClr val="accent1"/>
-            </a:effectRef>
-            <a:fontRef idx="minor"/>
-          </p:style>
-          <p:txBody>
-            <a:bodyPr lIns="56250" tIns="28125" rIns="56250" bIns="28125" anchor="ctr">
-              <a:noAutofit/>
-            </a:bodyPr>
-            <a:lstStyle/>
-            <a:p>
-              <a:pPr algn="ctr"/>
-              <a:r>
-                <a:rPr lang="en-IN" sz="1280" spc="-1" dirty="0">
-                  <a:solidFill>
-                    <a:srgbClr val="000000"/>
-                  </a:solidFill>
-                  <a:latin typeface="Arial"/>
-                </a:rPr>
-                <a:t>HSR/PRP</a:t>
-              </a:r>
-            </a:p>
-          </p:txBody>
-        </p:sp>
-        <p:sp>
-          <p:nvSpPr>
-            <p:cNvPr id="48" name="CustomShape 8">
-              <a:extLst>
-                <a:ext uri="{FF2B5EF4-FFF2-40B4-BE49-F238E27FC236}">
-                  <a16:creationId xmlns:a16="http://schemas.microsoft.com/office/drawing/2014/main" id="{5A281F1F-1FED-41D1-9B89-8CD6235CB383}"/>
-                </a:ext>
-              </a:extLst>
-            </p:cNvPr>
-            <p:cNvSpPr/>
-            <p:nvPr/>
-          </p:nvSpPr>
-          <p:spPr>
-            <a:xfrm>
-              <a:off x="10079169" y="5714924"/>
-              <a:ext cx="1102161" cy="370347"/>
-            </a:xfrm>
-            <a:prstGeom prst="rect">
-              <a:avLst/>
-            </a:prstGeom>
-            <a:solidFill>
-              <a:srgbClr val="92D050"/>
-            </a:solidFill>
-            <a:ln>
-              <a:noFill/>
-            </a:ln>
-            <a:effectLst>
-              <a:outerShdw blurRad="50760" dist="37674" dir="2700000" algn="tl" rotWithShape="0">
-                <a:srgbClr val="000000">
-                  <a:alpha val="40000"/>
-                </a:srgbClr>
-              </a:outerShdw>
-            </a:effectLst>
-          </p:spPr>
-          <p:style>
-            <a:lnRef idx="2">
-              <a:schemeClr val="accent1">
-                <a:shade val="50000"/>
-              </a:schemeClr>
-            </a:lnRef>
-            <a:fillRef idx="1">
-              <a:schemeClr val="accent1"/>
-            </a:fillRef>
-            <a:effectRef idx="0">
-              <a:schemeClr val="accent1"/>
-            </a:effectRef>
-            <a:fontRef idx="minor"/>
-          </p:style>
-          <p:txBody>
-            <a:bodyPr lIns="56250" tIns="28125" rIns="56250" bIns="28125" anchor="ctr">
-              <a:noAutofit/>
-            </a:bodyPr>
-            <a:lstStyle/>
-            <a:p>
-              <a:pPr algn="ctr"/>
-              <a:r>
-                <a:rPr lang="en-IN" sz="1100" spc="-1" dirty="0">
-                  <a:solidFill>
-                    <a:srgbClr val="000000"/>
-                  </a:solidFill>
-                  <a:latin typeface="Arial"/>
-                </a:rPr>
-                <a:t>ENET MAC/Switch</a:t>
-              </a:r>
-            </a:p>
-          </p:txBody>
-        </p:sp>
-        <p:sp>
-          <p:nvSpPr>
-            <p:cNvPr id="81" name="CustomShape 8">
-              <a:extLst>
-                <a:ext uri="{FF2B5EF4-FFF2-40B4-BE49-F238E27FC236}">
-                  <a16:creationId xmlns:a16="http://schemas.microsoft.com/office/drawing/2014/main" id="{DA175DF9-35CC-4E63-BB7D-886445F2B22F}"/>
-                </a:ext>
-              </a:extLst>
-            </p:cNvPr>
-            <p:cNvSpPr/>
-            <p:nvPr/>
-          </p:nvSpPr>
-          <p:spPr>
-            <a:xfrm>
-              <a:off x="10041247" y="2773540"/>
-              <a:ext cx="1114418" cy="370347"/>
-            </a:xfrm>
-            <a:prstGeom prst="rect">
-              <a:avLst/>
-            </a:prstGeom>
-            <a:solidFill>
-              <a:srgbClr val="00B0F0"/>
-            </a:solidFill>
-            <a:ln>
-              <a:noFill/>
-            </a:ln>
-            <a:effectLst>
-              <a:outerShdw blurRad="50760" dist="37674" dir="2700000" algn="tl" rotWithShape="0">
-                <a:srgbClr val="000000">
-                  <a:alpha val="40000"/>
-                </a:srgbClr>
-              </a:outerShdw>
-            </a:effectLst>
-          </p:spPr>
-          <p:style>
-            <a:lnRef idx="2">
-              <a:schemeClr val="accent1">
-                <a:shade val="50000"/>
-              </a:schemeClr>
-            </a:lnRef>
-            <a:fillRef idx="1">
-              <a:schemeClr val="accent1"/>
-            </a:fillRef>
-            <a:effectRef idx="0">
-              <a:schemeClr val="accent1"/>
-            </a:effectRef>
-            <a:fontRef idx="minor"/>
-          </p:style>
-          <p:txBody>
-            <a:bodyPr lIns="90000" tIns="45000" rIns="90000" bIns="45000" anchor="ctr">
-              <a:noAutofit/>
-            </a:bodyPr>
-            <a:lstStyle/>
-            <a:p>
-              <a:pPr algn="ctr"/>
-              <a:r>
-                <a:rPr lang="en-IN" sz="1280" spc="-2" dirty="0">
-                  <a:solidFill>
-                    <a:srgbClr val="000000"/>
-                  </a:solidFill>
-                  <a:latin typeface="Arial"/>
-                </a:rPr>
-                <a:t>BiSS-C</a:t>
+                <a:t>Nikon A-Format</a:t>
               </a:r>
             </a:p>
           </p:txBody>
         </p:sp>
       </p:grpSp>
-      <p:sp>
-        <p:nvSpPr>
-          <p:cNvPr id="82" name="CustomShape 15">
-            <a:extLst>
-              <a:ext uri="{FF2B5EF4-FFF2-40B4-BE49-F238E27FC236}">
-                <a16:creationId xmlns:a16="http://schemas.microsoft.com/office/drawing/2014/main" id="{A66BEF25-718C-42F8-B4AD-47D4B69E58E4}"/>
-              </a:ext>
-            </a:extLst>
-          </p:cNvPr>
-          <p:cNvSpPr/>
-          <p:nvPr/>
-        </p:nvSpPr>
-        <p:spPr>
-          <a:xfrm>
-            <a:off x="5541509" y="4201182"/>
-            <a:ext cx="987669" cy="449640"/>
-          </a:xfrm>
-          <a:prstGeom prst="rect">
-            <a:avLst/>
-          </a:prstGeom>
-          <a:solidFill>
-            <a:srgbClr val="00B0F0"/>
-          </a:solidFill>
-          <a:ln>
-            <a:noFill/>
-          </a:ln>
-          <a:effectLst>
-            <a:outerShdw blurRad="50760" dist="37674" dir="2700000" algn="tl" rotWithShape="0">
-              <a:srgbClr val="000000">
-                <a:alpha val="40000"/>
-              </a:srgbClr>
-            </a:outerShdw>
-          </a:effectLst>
-        </p:spPr>
-        <p:style>
-          <a:lnRef idx="2">
-            <a:schemeClr val="accent1">
-              <a:shade val="50000"/>
-            </a:schemeClr>
-          </a:lnRef>
-          <a:fillRef idx="1">
-            <a:schemeClr val="accent1"/>
-          </a:fillRef>
-          <a:effectRef idx="0">
-            <a:schemeClr val="accent1"/>
-          </a:effectRef>
-          <a:fontRef idx="minor"/>
-        </p:style>
-        <p:txBody>
-          <a:bodyPr wrap="none" lIns="90000" tIns="45000" rIns="90000" bIns="45000" anchor="ctr">
-            <a:noAutofit/>
-          </a:bodyPr>
-          <a:lstStyle/>
-          <a:p>
-            <a:pPr algn="ctr"/>
-            <a:r>
-              <a:rPr lang="en-US" sz="1280" spc="-2" dirty="0">
-                <a:solidFill>
-                  <a:srgbClr val="000000"/>
-                </a:solidFill>
-              </a:rPr>
-              <a:t>PRUICSS </a:t>
-            </a:r>
-          </a:p>
-          <a:p>
-            <a:pPr algn="ctr"/>
-            <a:r>
-              <a:rPr lang="en-US" sz="1280" spc="-2" dirty="0">
-                <a:solidFill>
-                  <a:srgbClr val="000000"/>
-                </a:solidFill>
-              </a:rPr>
-              <a:t>PWM</a:t>
-            </a:r>
-            <a:endParaRPr lang="en-IN" sz="1280" spc="-2" dirty="0">
-              <a:solidFill>
-                <a:srgbClr val="000000"/>
-              </a:solidFill>
-              <a:latin typeface="Arial"/>
-            </a:endParaRPr>
-          </a:p>
-        </p:txBody>
-      </p:sp>
-      <p:sp>
-        <p:nvSpPr>
-          <p:cNvPr id="95" name="CustomShape 15">
-            <a:extLst>
-              <a:ext uri="{FF2B5EF4-FFF2-40B4-BE49-F238E27FC236}">
-                <a16:creationId xmlns:a16="http://schemas.microsoft.com/office/drawing/2014/main" id="{A187BFD9-EF2A-48E9-8359-90165FE849BF}"/>
-              </a:ext>
-            </a:extLst>
-          </p:cNvPr>
-          <p:cNvSpPr/>
-          <p:nvPr/>
-        </p:nvSpPr>
-        <p:spPr>
-          <a:xfrm>
-            <a:off x="8919195" y="4170286"/>
-            <a:ext cx="953178" cy="443974"/>
-          </a:xfrm>
-          <a:prstGeom prst="rect">
-            <a:avLst/>
-          </a:prstGeom>
-          <a:solidFill>
-            <a:srgbClr val="00B0F0"/>
-          </a:solidFill>
-          <a:ln>
-            <a:noFill/>
-          </a:ln>
-          <a:effectLst>
-            <a:outerShdw blurRad="50760" dist="37674" dir="2700000" algn="tl" rotWithShape="0">
-              <a:srgbClr val="000000">
-                <a:alpha val="40000"/>
-              </a:srgbClr>
-            </a:outerShdw>
-          </a:effectLst>
-        </p:spPr>
-        <p:style>
-          <a:lnRef idx="2">
-            <a:schemeClr val="accent1">
-              <a:shade val="50000"/>
-            </a:schemeClr>
-          </a:lnRef>
-          <a:fillRef idx="1">
-            <a:schemeClr val="accent1"/>
-          </a:fillRef>
-          <a:effectRef idx="0">
-            <a:schemeClr val="accent1"/>
-          </a:effectRef>
-          <a:fontRef idx="minor"/>
-        </p:style>
-        <p:txBody>
-          <a:bodyPr lIns="90000" tIns="45000" rIns="90000" bIns="45000" anchor="ctr">
-            <a:noAutofit/>
-          </a:bodyPr>
-          <a:lstStyle/>
-          <a:p>
-            <a:pPr algn="ctr"/>
-            <a:r>
-              <a:rPr lang="en-US" sz="1280" spc="-2" dirty="0">
-                <a:solidFill>
-                  <a:srgbClr val="000000"/>
-                </a:solidFill>
-              </a:rPr>
-              <a:t>BiSS-C</a:t>
-            </a:r>
-            <a:endParaRPr lang="en-IN" sz="1280" spc="-2" dirty="0">
-              <a:solidFill>
-                <a:srgbClr val="000000"/>
-              </a:solidFill>
-              <a:latin typeface="Arial"/>
-            </a:endParaRPr>
-          </a:p>
-        </p:txBody>
-      </p:sp>
     </p:spTree>
     <p:extLst>
       <p:ext uri="{BB962C8B-B14F-4D97-AF65-F5344CB8AC3E}">
@@ -10089,8 +10355,8 @@
         </p:nvSpPr>
         <p:spPr>
           <a:xfrm>
-            <a:off x="5095199" y="1310237"/>
-            <a:ext cx="1069926" cy="449640"/>
+            <a:off x="5025670" y="999061"/>
+            <a:ext cx="1185077" cy="455099"/>
           </a:xfrm>
           <a:prstGeom prst="rect">
             <a:avLst/>
@@ -10156,8 +10422,8 @@
         </p:nvSpPr>
         <p:spPr>
           <a:xfrm>
-            <a:off x="6415211" y="1594572"/>
-            <a:ext cx="1094959" cy="497782"/>
+            <a:off x="6415211" y="1588356"/>
+            <a:ext cx="1094959" cy="501106"/>
           </a:xfrm>
           <a:prstGeom prst="rect">
             <a:avLst/>
@@ -10228,8 +10494,8 @@
         </p:nvSpPr>
         <p:spPr>
           <a:xfrm>
-            <a:off x="6415211" y="946915"/>
-            <a:ext cx="1093502" cy="508005"/>
+            <a:off x="6415211" y="999062"/>
+            <a:ext cx="1093502" cy="449642"/>
           </a:xfrm>
           <a:prstGeom prst="rect">
             <a:avLst/>
@@ -10277,6 +10543,91 @@
                 <a:latin typeface="Arial"/>
               </a:rPr>
               <a:t>Tamagawa</a:t>
+            </a:r>
+          </a:p>
+        </p:txBody>
+      </p:sp>
+      <p:sp>
+        <p:nvSpPr>
+          <p:cNvPr id="38" name="CustomShape 8">
+            <a:extLst>
+              <a:ext uri="{FF2B5EF4-FFF2-40B4-BE49-F238E27FC236}">
+                <a16:creationId xmlns:a16="http://schemas.microsoft.com/office/drawing/2014/main" id="{5211EEA9-63DF-4DAF-B441-2B51CD21E224}"/>
+              </a:ext>
+            </a:extLst>
+          </p:cNvPr>
+          <p:cNvSpPr/>
+          <p:nvPr/>
+        </p:nvSpPr>
+        <p:spPr>
+          <a:xfrm>
+            <a:off x="5025671" y="1598368"/>
+            <a:ext cx="1186534" cy="491094"/>
+          </a:xfrm>
+          <a:prstGeom prst="rect">
+            <a:avLst/>
+          </a:prstGeom>
+          <a:solidFill>
+            <a:srgbClr val="00B0F0"/>
+          </a:solidFill>
+          <a:ln>
+            <a:noFill/>
+          </a:ln>
+          <a:effectLst>
+            <a:outerShdw blurRad="50760" dist="37674" dir="2700000" algn="tl" rotWithShape="0">
+              <a:srgbClr val="000000">
+                <a:alpha val="40000"/>
+              </a:srgbClr>
+            </a:outerShdw>
+          </a:effectLst>
+        </p:spPr>
+        <p:style>
+          <a:lnRef idx="2">
+            <a:schemeClr val="accent1">
+              <a:shade val="50000"/>
+            </a:schemeClr>
+          </a:lnRef>
+          <a:fillRef idx="1">
+            <a:schemeClr val="accent1"/>
+          </a:fillRef>
+          <a:effectRef idx="0">
+            <a:schemeClr val="accent1"/>
+          </a:effectRef>
+          <a:fontRef idx="minor"/>
+        </p:style>
+        <p:txBody>
+          <a:bodyPr wrap="none" lIns="90000" tIns="45000" rIns="90000" bIns="45000" anchor="ctr">
+            <a:noAutofit/>
+          </a:bodyPr>
+          <a:lstStyle/>
+          <a:p>
+            <a:pPr algn="ctr"/>
+            <a:r>
+              <a:rPr lang="en-US" sz="1100" dirty="0">
+                <a:latin typeface="Calibri" panose="020F0502020204030204" pitchFamily="34" charset="0"/>
+                <a:cs typeface="Calibri" panose="020F0502020204030204" pitchFamily="34" charset="0"/>
+              </a:rPr>
+              <a:t>Universal Motor </a:t>
+            </a:r>
+          </a:p>
+          <a:p>
+            <a:pPr algn="ctr"/>
+            <a:r>
+              <a:rPr lang="en-US" sz="1100" dirty="0">
+                <a:latin typeface="Calibri" panose="020F0502020204030204" pitchFamily="34" charset="0"/>
+                <a:cs typeface="Calibri" panose="020F0502020204030204" pitchFamily="34" charset="0"/>
+              </a:rPr>
+              <a:t>Control</a:t>
+            </a:r>
+          </a:p>
+          <a:p>
+            <a:pPr algn="ctr"/>
+            <a:r>
+              <a:rPr lang="en-US" sz="1100" dirty="0">
+                <a:latin typeface="Calibri" panose="020F0502020204030204" pitchFamily="34" charset="0"/>
+                <a:cs typeface="Calibri" panose="020F0502020204030204" pitchFamily="34" charset="0"/>
+              </a:rPr>
+              <a:t>Reference Design</a:t>
             </a:r>
           </a:p>
         </p:txBody>

</xml_diff>